<commit_message>
Fixed transparencies in header
</commit_message>
<xml_diff>
--- a/design/encabezado.pptx
+++ b/design/encabezado.pptx
@@ -5,10 +5,11 @@
     <p:sldMasterId id="2147483720" r:id="rId1"/>
   </p:sldMasterIdLst>
   <p:notesMasterIdLst>
-    <p:notesMasterId r:id="rId3"/>
+    <p:notesMasterId r:id="rId4"/>
   </p:notesMasterIdLst>
   <p:sldIdLst>
-    <p:sldId id="268" r:id="rId2"/>
+    <p:sldId id="269" r:id="rId2"/>
+    <p:sldId id="268" r:id="rId3"/>
   </p:sldIdLst>
   <p:sldSz cx="51206400" cy="28803600"/>
   <p:notesSz cx="6858000" cy="9144000"/>
@@ -136,6 +137,10 @@
 </p:presentation>
 </file>
 
+<file path=ppt/revisionInfo.xml><?xml version="1.0" encoding="utf-8"?>
+<p1510:revInfo xmlns:a="http://schemas.openxmlformats.org/drawingml/2006/main" xmlns:r="http://schemas.openxmlformats.org/officeDocument/2006/relationships" xmlns:p1510="http://schemas.microsoft.com/office/powerpoint/2015/10/main"/>
+</file>
+
 <file path=ppt/notesMasters/notesMaster1.xml><?xml version="1.0" encoding="utf-8"?>
 <p:notesMaster xmlns:a="http://schemas.openxmlformats.org/drawingml/2006/main" xmlns:r="http://schemas.openxmlformats.org/officeDocument/2006/relationships" xmlns:p="http://schemas.openxmlformats.org/presentationml/2006/main">
   <p:cSld>
@@ -218,7 +223,7 @@
           <a:p>
             <a:fld id="{A9FE03EE-1C82-4E99-9DF8-4A05B170F250}" type="datetimeFigureOut">
               <a:rPr lang="en-US" smtClean="0"/>
-              <a:t>3/31/2016</a:t>
+              <a:t>1/28/2018</a:t>
             </a:fld>
             <a:endParaRPr lang="en-US" dirty="0"/>
           </a:p>
@@ -282,38 +287,37 @@
           <a:p>
             <a:pPr lvl="0"/>
             <a:r>
-              <a:rPr lang="en-US" smtClean="0"/>
+              <a:rPr lang="en-US"/>
               <a:t>Click to edit Master text styles</a:t>
             </a:r>
           </a:p>
           <a:p>
             <a:pPr lvl="1"/>
             <a:r>
-              <a:rPr lang="en-US" smtClean="0"/>
+              <a:rPr lang="en-US"/>
               <a:t>Second level</a:t>
             </a:r>
           </a:p>
           <a:p>
             <a:pPr lvl="2"/>
             <a:r>
-              <a:rPr lang="en-US" smtClean="0"/>
+              <a:rPr lang="en-US"/>
               <a:t>Third level</a:t>
             </a:r>
           </a:p>
           <a:p>
             <a:pPr lvl="3"/>
             <a:r>
-              <a:rPr lang="en-US" smtClean="0"/>
+              <a:rPr lang="en-US"/>
               <a:t>Fourth level</a:t>
             </a:r>
           </a:p>
           <a:p>
             <a:pPr lvl="4"/>
             <a:r>
-              <a:rPr lang="en-US" smtClean="0"/>
+              <a:rPr lang="en-US"/>
               <a:t>Fifth level</a:t>
             </a:r>
-            <a:endParaRPr lang="en-US"/>
           </a:p>
         </p:txBody>
       </p:sp>
@@ -565,6 +569,95 @@
     </p:spTree>
     <p:extLst>
       <p:ext uri="{BB962C8B-B14F-4D97-AF65-F5344CB8AC3E}">
+        <p14:creationId xmlns:p14="http://schemas.microsoft.com/office/powerpoint/2010/main" val="4275012963"/>
+      </p:ext>
+    </p:extLst>
+  </p:cSld>
+  <p:clrMapOvr>
+    <a:masterClrMapping/>
+  </p:clrMapOvr>
+</p:notes>
+</file>
+
+<file path=ppt/notesSlides/notesSlide2.xml><?xml version="1.0" encoding="utf-8"?>
+<p:notes xmlns:a="http://schemas.openxmlformats.org/drawingml/2006/main" xmlns:r="http://schemas.openxmlformats.org/officeDocument/2006/relationships" xmlns:p="http://schemas.openxmlformats.org/presentationml/2006/main">
+  <p:cSld>
+    <p:spTree>
+      <p:nvGrpSpPr>
+        <p:cNvPr id="1" name=""/>
+        <p:cNvGrpSpPr/>
+        <p:nvPr/>
+      </p:nvGrpSpPr>
+      <p:grpSpPr>
+        <a:xfrm>
+          <a:off x="0" y="0"/>
+          <a:ext cx="0" cy="0"/>
+          <a:chOff x="0" y="0"/>
+          <a:chExt cx="0" cy="0"/>
+        </a:xfrm>
+      </p:grpSpPr>
+      <p:sp>
+        <p:nvSpPr>
+          <p:cNvPr id="2" name="Slide Image Placeholder 1"/>
+          <p:cNvSpPr>
+            <a:spLocks noGrp="1" noRot="1" noChangeAspect="1"/>
+          </p:cNvSpPr>
+          <p:nvPr>
+            <p:ph type="sldImg"/>
+          </p:nvPr>
+        </p:nvSpPr>
+        <p:spPr>
+          <a:xfrm>
+            <a:off x="381000" y="685800"/>
+            <a:ext cx="6096000" cy="3429000"/>
+          </a:xfrm>
+        </p:spPr>
+      </p:sp>
+      <p:sp>
+        <p:nvSpPr>
+          <p:cNvPr id="3" name="Notes Placeholder 2"/>
+          <p:cNvSpPr>
+            <a:spLocks noGrp="1"/>
+          </p:cNvSpPr>
+          <p:nvPr>
+            <p:ph type="body" idx="1"/>
+          </p:nvPr>
+        </p:nvSpPr>
+        <p:spPr/>
+        <p:txBody>
+          <a:bodyPr/>
+          <a:lstStyle/>
+          <a:p>
+            <a:endParaRPr lang="en-US" dirty="0"/>
+          </a:p>
+        </p:txBody>
+      </p:sp>
+      <p:sp>
+        <p:nvSpPr>
+          <p:cNvPr id="4" name="Slide Number Placeholder 3"/>
+          <p:cNvSpPr>
+            <a:spLocks noGrp="1"/>
+          </p:cNvSpPr>
+          <p:nvPr>
+            <p:ph type="sldNum" sz="quarter" idx="10"/>
+          </p:nvPr>
+        </p:nvSpPr>
+        <p:spPr/>
+        <p:txBody>
+          <a:bodyPr/>
+          <a:lstStyle/>
+          <a:p>
+            <a:fld id="{FAC575F2-BB5C-44BA-9A26-65F68A1741DE}" type="slidenum">
+              <a:rPr lang="en-US" smtClean="0"/>
+              <a:t>2</a:t>
+            </a:fld>
+            <a:endParaRPr lang="en-US" dirty="0"/>
+          </a:p>
+        </p:txBody>
+      </p:sp>
+    </p:spTree>
+    <p:extLst>
+      <p:ext uri="{BB962C8B-B14F-4D97-AF65-F5344CB8AC3E}">
         <p14:creationId xmlns:p14="http://schemas.microsoft.com/office/powerpoint/2010/main" val="3825422103"/>
       </p:ext>
     </p:extLst>
@@ -663,10 +756,9 @@
           </a:lstStyle>
           <a:p>
             <a:r>
-              <a:rPr kumimoji="0" lang="en-US" smtClean="0"/>
+              <a:rPr kumimoji="0" lang="en-US"/>
               <a:t>Click to edit Master title style</a:t>
             </a:r>
-            <a:endParaRPr kumimoji="0" lang="en-US"/>
           </a:p>
         </p:txBody>
       </p:sp>
@@ -724,10 +816,9 @@
           </a:lstStyle>
           <a:p>
             <a:r>
-              <a:rPr kumimoji="0" lang="en-US" smtClean="0"/>
+              <a:rPr kumimoji="0" lang="en-US"/>
               <a:t>Click to edit Master subtitle style</a:t>
             </a:r>
-            <a:endParaRPr kumimoji="0" lang="en-US"/>
           </a:p>
         </p:txBody>
       </p:sp>
@@ -748,7 +839,7 @@
           <a:p>
             <a:fld id="{D44D2351-1F20-4245-B389-419D0CB28AFC}" type="datetime12">
               <a:rPr lang="en-US" smtClean="0"/>
-              <a:t>2:42 PM</a:t>
+              <a:t>12:23 AM</a:t>
             </a:fld>
             <a:endParaRPr lang="en-US" dirty="0"/>
           </a:p>
@@ -770,10 +861,9 @@
           <a:lstStyle/>
           <a:p>
             <a:r>
-              <a:rPr lang="en-US" dirty="0" smtClean="0"/>
+              <a:rPr lang="en-US" dirty="0"/>
               <a:t>Carlos H. Borca</a:t>
             </a:r>
-            <a:endParaRPr lang="en-US" dirty="0"/>
           </a:p>
         </p:txBody>
       </p:sp>
@@ -853,10 +943,9 @@
           <a:lstStyle/>
           <a:p>
             <a:r>
-              <a:rPr kumimoji="0" lang="en-US" smtClean="0"/>
+              <a:rPr kumimoji="0" lang="en-US"/>
               <a:t>Click to edit Master title style</a:t>
             </a:r>
-            <a:endParaRPr kumimoji="0" lang="en-US"/>
           </a:p>
         </p:txBody>
       </p:sp>
@@ -877,35 +966,35 @@
           <a:p>
             <a:pPr lvl="0" eaLnBrk="1" latinLnBrk="0" hangingPunct="1"/>
             <a:r>
-              <a:rPr lang="en-US" smtClean="0"/>
+              <a:rPr lang="en-US"/>
               <a:t>Click to edit Master text styles</a:t>
             </a:r>
           </a:p>
           <a:p>
             <a:pPr lvl="1" eaLnBrk="1" latinLnBrk="0" hangingPunct="1"/>
             <a:r>
-              <a:rPr lang="en-US" smtClean="0"/>
+              <a:rPr lang="en-US"/>
               <a:t>Second level</a:t>
             </a:r>
           </a:p>
           <a:p>
             <a:pPr lvl="2" eaLnBrk="1" latinLnBrk="0" hangingPunct="1"/>
             <a:r>
-              <a:rPr lang="en-US" smtClean="0"/>
+              <a:rPr lang="en-US"/>
               <a:t>Third level</a:t>
             </a:r>
           </a:p>
           <a:p>
             <a:pPr lvl="3" eaLnBrk="1" latinLnBrk="0" hangingPunct="1"/>
             <a:r>
-              <a:rPr lang="en-US" smtClean="0"/>
+              <a:rPr lang="en-US"/>
               <a:t>Fourth level</a:t>
             </a:r>
           </a:p>
           <a:p>
             <a:pPr lvl="4" eaLnBrk="1" latinLnBrk="0" hangingPunct="1"/>
             <a:r>
-              <a:rPr lang="en-US" smtClean="0"/>
+              <a:rPr lang="en-US"/>
               <a:t>Fifth level</a:t>
             </a:r>
             <a:endParaRPr kumimoji="0" lang="en-US"/>
@@ -929,7 +1018,7 @@
           <a:p>
             <a:fld id="{7E522AC0-2225-44D5-85DD-69FF70C3BCA3}" type="datetime12">
               <a:rPr lang="en-US" smtClean="0"/>
-              <a:t>2:42 PM</a:t>
+              <a:t>12:23 AM</a:t>
             </a:fld>
             <a:endParaRPr lang="en-US" dirty="0"/>
           </a:p>
@@ -951,10 +1040,9 @@
           <a:lstStyle/>
           <a:p>
             <a:r>
-              <a:rPr lang="en-US" dirty="0" smtClean="0"/>
+              <a:rPr lang="en-US" dirty="0"/>
               <a:t>Carlos H. Borca</a:t>
             </a:r>
-            <a:endParaRPr lang="en-US" dirty="0"/>
           </a:p>
         </p:txBody>
       </p:sp>
@@ -1039,10 +1127,9 @@
           <a:lstStyle/>
           <a:p>
             <a:r>
-              <a:rPr kumimoji="0" lang="en-US" smtClean="0"/>
+              <a:rPr kumimoji="0" lang="en-US"/>
               <a:t>Click to edit Master title style</a:t>
             </a:r>
-            <a:endParaRPr kumimoji="0" lang="en-US"/>
           </a:p>
         </p:txBody>
       </p:sp>
@@ -1068,35 +1155,35 @@
           <a:p>
             <a:pPr lvl="0" eaLnBrk="1" latinLnBrk="0" hangingPunct="1"/>
             <a:r>
-              <a:rPr lang="en-US" smtClean="0"/>
+              <a:rPr lang="en-US"/>
               <a:t>Click to edit Master text styles</a:t>
             </a:r>
           </a:p>
           <a:p>
             <a:pPr lvl="1" eaLnBrk="1" latinLnBrk="0" hangingPunct="1"/>
             <a:r>
-              <a:rPr lang="en-US" smtClean="0"/>
+              <a:rPr lang="en-US"/>
               <a:t>Second level</a:t>
             </a:r>
           </a:p>
           <a:p>
             <a:pPr lvl="2" eaLnBrk="1" latinLnBrk="0" hangingPunct="1"/>
             <a:r>
-              <a:rPr lang="en-US" smtClean="0"/>
+              <a:rPr lang="en-US"/>
               <a:t>Third level</a:t>
             </a:r>
           </a:p>
           <a:p>
             <a:pPr lvl="3" eaLnBrk="1" latinLnBrk="0" hangingPunct="1"/>
             <a:r>
-              <a:rPr lang="en-US" smtClean="0"/>
+              <a:rPr lang="en-US"/>
               <a:t>Fourth level</a:t>
             </a:r>
           </a:p>
           <a:p>
             <a:pPr lvl="4" eaLnBrk="1" latinLnBrk="0" hangingPunct="1"/>
             <a:r>
-              <a:rPr lang="en-US" smtClean="0"/>
+              <a:rPr lang="en-US"/>
               <a:t>Fifth level</a:t>
             </a:r>
             <a:endParaRPr kumimoji="0" lang="en-US"/>
@@ -1120,7 +1207,7 @@
           <a:p>
             <a:fld id="{4E7D4F7B-3389-415B-B217-40891253FD77}" type="datetime12">
               <a:rPr lang="en-US" smtClean="0"/>
-              <a:t>2:42 PM</a:t>
+              <a:t>12:23 AM</a:t>
             </a:fld>
             <a:endParaRPr lang="en-US" dirty="0"/>
           </a:p>
@@ -1142,10 +1229,9 @@
           <a:lstStyle/>
           <a:p>
             <a:r>
-              <a:rPr lang="en-US" dirty="0" smtClean="0"/>
+              <a:rPr lang="en-US" dirty="0"/>
               <a:t>Carlos H. Borca</a:t>
             </a:r>
-            <a:endParaRPr lang="en-US" dirty="0"/>
           </a:p>
         </p:txBody>
       </p:sp>
@@ -1225,10 +1311,9 @@
           <a:lstStyle/>
           <a:p>
             <a:r>
-              <a:rPr kumimoji="0" lang="en-US" smtClean="0"/>
+              <a:rPr kumimoji="0" lang="en-US"/>
               <a:t>Click to edit Master title style</a:t>
             </a:r>
-            <a:endParaRPr kumimoji="0" lang="en-US"/>
           </a:p>
         </p:txBody>
       </p:sp>
@@ -1249,35 +1334,35 @@
           <a:p>
             <a:pPr lvl="0" eaLnBrk="1" latinLnBrk="0" hangingPunct="1"/>
             <a:r>
-              <a:rPr lang="en-US" smtClean="0"/>
+              <a:rPr lang="en-US"/>
               <a:t>Click to edit Master text styles</a:t>
             </a:r>
           </a:p>
           <a:p>
             <a:pPr lvl="1" eaLnBrk="1" latinLnBrk="0" hangingPunct="1"/>
             <a:r>
-              <a:rPr lang="en-US" smtClean="0"/>
+              <a:rPr lang="en-US"/>
               <a:t>Second level</a:t>
             </a:r>
           </a:p>
           <a:p>
             <a:pPr lvl="2" eaLnBrk="1" latinLnBrk="0" hangingPunct="1"/>
             <a:r>
-              <a:rPr lang="en-US" smtClean="0"/>
+              <a:rPr lang="en-US"/>
               <a:t>Third level</a:t>
             </a:r>
           </a:p>
           <a:p>
             <a:pPr lvl="3" eaLnBrk="1" latinLnBrk="0" hangingPunct="1"/>
             <a:r>
-              <a:rPr lang="en-US" smtClean="0"/>
+              <a:rPr lang="en-US"/>
               <a:t>Fourth level</a:t>
             </a:r>
           </a:p>
           <a:p>
             <a:pPr lvl="4" eaLnBrk="1" latinLnBrk="0" hangingPunct="1"/>
             <a:r>
-              <a:rPr lang="en-US" smtClean="0"/>
+              <a:rPr lang="en-US"/>
               <a:t>Fifth level</a:t>
             </a:r>
             <a:endParaRPr kumimoji="0" lang="en-US"/>
@@ -1301,7 +1386,7 @@
           <a:p>
             <a:fld id="{A289EB68-F6EE-4E9A-BB3F-5D7F535B883B}" type="datetime12">
               <a:rPr lang="en-US" smtClean="0"/>
-              <a:t>2:42 PM</a:t>
+              <a:t>12:23 AM</a:t>
             </a:fld>
             <a:endParaRPr lang="en-US" dirty="0"/>
           </a:p>
@@ -1323,10 +1408,9 @@
           <a:lstStyle/>
           <a:p>
             <a:r>
-              <a:rPr lang="en-US" dirty="0" smtClean="0"/>
+              <a:rPr lang="en-US" dirty="0"/>
               <a:t>Carlos H. Borca</a:t>
             </a:r>
-            <a:endParaRPr lang="en-US" dirty="0"/>
           </a:p>
         </p:txBody>
       </p:sp>
@@ -1458,10 +1542,9 @@
           </a:lstStyle>
           <a:p>
             <a:r>
-              <a:rPr kumimoji="0" lang="en-US" smtClean="0"/>
+              <a:rPr kumimoji="0" lang="en-US"/>
               <a:t>Click to edit Master title style</a:t>
             </a:r>
-            <a:endParaRPr kumimoji="0" lang="en-US"/>
           </a:p>
         </p:txBody>
       </p:sp>
@@ -1536,7 +1619,7 @@
           <a:p>
             <a:pPr lvl="0" eaLnBrk="1" latinLnBrk="0" hangingPunct="1"/>
             <a:r>
-              <a:rPr kumimoji="0" lang="en-US" smtClean="0"/>
+              <a:rPr kumimoji="0" lang="en-US"/>
               <a:t>Click to edit Master text styles</a:t>
             </a:r>
           </a:p>
@@ -1559,7 +1642,7 @@
           <a:p>
             <a:fld id="{5ADCBF7E-A68A-42EE-9D9D-825A9A1291F2}" type="datetime12">
               <a:rPr lang="en-US" smtClean="0"/>
-              <a:t>2:42 PM</a:t>
+              <a:t>12:23 AM</a:t>
             </a:fld>
             <a:endParaRPr lang="en-US" dirty="0"/>
           </a:p>
@@ -1581,10 +1664,9 @@
           <a:lstStyle/>
           <a:p>
             <a:r>
-              <a:rPr lang="en-US" dirty="0" smtClean="0"/>
+              <a:rPr lang="en-US" dirty="0"/>
               <a:t>Carlos H. Borca</a:t>
             </a:r>
-            <a:endParaRPr lang="en-US" dirty="0"/>
           </a:p>
         </p:txBody>
       </p:sp>
@@ -1669,10 +1751,9 @@
           <a:lstStyle/>
           <a:p>
             <a:r>
-              <a:rPr kumimoji="0" lang="en-US" smtClean="0"/>
+              <a:rPr kumimoji="0" lang="en-US"/>
               <a:t>Click to edit Master title style</a:t>
             </a:r>
-            <a:endParaRPr kumimoji="0" lang="en-US"/>
           </a:p>
         </p:txBody>
       </p:sp>
@@ -1714,35 +1795,35 @@
           <a:p>
             <a:pPr lvl="0" eaLnBrk="1" latinLnBrk="0" hangingPunct="1"/>
             <a:r>
-              <a:rPr lang="en-US" smtClean="0"/>
+              <a:rPr lang="en-US"/>
               <a:t>Click to edit Master text styles</a:t>
             </a:r>
           </a:p>
           <a:p>
             <a:pPr lvl="1" eaLnBrk="1" latinLnBrk="0" hangingPunct="1"/>
             <a:r>
-              <a:rPr lang="en-US" smtClean="0"/>
+              <a:rPr lang="en-US"/>
               <a:t>Second level</a:t>
             </a:r>
           </a:p>
           <a:p>
             <a:pPr lvl="2" eaLnBrk="1" latinLnBrk="0" hangingPunct="1"/>
             <a:r>
-              <a:rPr lang="en-US" smtClean="0"/>
+              <a:rPr lang="en-US"/>
               <a:t>Third level</a:t>
             </a:r>
           </a:p>
           <a:p>
             <a:pPr lvl="3" eaLnBrk="1" latinLnBrk="0" hangingPunct="1"/>
             <a:r>
-              <a:rPr lang="en-US" smtClean="0"/>
+              <a:rPr lang="en-US"/>
               <a:t>Fourth level</a:t>
             </a:r>
           </a:p>
           <a:p>
             <a:pPr lvl="4" eaLnBrk="1" latinLnBrk="0" hangingPunct="1"/>
             <a:r>
-              <a:rPr lang="en-US" smtClean="0"/>
+              <a:rPr lang="en-US"/>
               <a:t>Fifth level</a:t>
             </a:r>
             <a:endParaRPr kumimoji="0" lang="en-US"/>
@@ -1787,35 +1868,35 @@
           <a:p>
             <a:pPr lvl="0" eaLnBrk="1" latinLnBrk="0" hangingPunct="1"/>
             <a:r>
-              <a:rPr lang="en-US" smtClean="0"/>
+              <a:rPr lang="en-US"/>
               <a:t>Click to edit Master text styles</a:t>
             </a:r>
           </a:p>
           <a:p>
             <a:pPr lvl="1" eaLnBrk="1" latinLnBrk="0" hangingPunct="1"/>
             <a:r>
-              <a:rPr lang="en-US" smtClean="0"/>
+              <a:rPr lang="en-US"/>
               <a:t>Second level</a:t>
             </a:r>
           </a:p>
           <a:p>
             <a:pPr lvl="2" eaLnBrk="1" latinLnBrk="0" hangingPunct="1"/>
             <a:r>
-              <a:rPr lang="en-US" smtClean="0"/>
+              <a:rPr lang="en-US"/>
               <a:t>Third level</a:t>
             </a:r>
           </a:p>
           <a:p>
             <a:pPr lvl="3" eaLnBrk="1" latinLnBrk="0" hangingPunct="1"/>
             <a:r>
-              <a:rPr lang="en-US" smtClean="0"/>
+              <a:rPr lang="en-US"/>
               <a:t>Fourth level</a:t>
             </a:r>
           </a:p>
           <a:p>
             <a:pPr lvl="4" eaLnBrk="1" latinLnBrk="0" hangingPunct="1"/>
             <a:r>
-              <a:rPr lang="en-US" smtClean="0"/>
+              <a:rPr lang="en-US"/>
               <a:t>Fifth level</a:t>
             </a:r>
             <a:endParaRPr kumimoji="0" lang="en-US"/>
@@ -1839,7 +1920,7 @@
           <a:p>
             <a:fld id="{D1637FC1-476F-4955-936A-6E8B672DC59D}" type="datetime12">
               <a:rPr lang="en-US" smtClean="0"/>
-              <a:t>2:42 PM</a:t>
+              <a:t>12:23 AM</a:t>
             </a:fld>
             <a:endParaRPr lang="en-US" dirty="0"/>
           </a:p>
@@ -1861,10 +1942,9 @@
           <a:lstStyle/>
           <a:p>
             <a:r>
-              <a:rPr lang="en-US" dirty="0" smtClean="0"/>
+              <a:rPr lang="en-US" dirty="0"/>
               <a:t>Carlos H. Borca</a:t>
             </a:r>
-            <a:endParaRPr lang="en-US" dirty="0"/>
           </a:p>
         </p:txBody>
       </p:sp>
@@ -1953,10 +2033,9 @@
           </a:lstStyle>
           <a:p>
             <a:r>
-              <a:rPr kumimoji="0" lang="en-US" smtClean="0"/>
+              <a:rPr kumimoji="0" lang="en-US"/>
               <a:t>Click to edit Master title style</a:t>
             </a:r>
-            <a:endParaRPr kumimoji="0" lang="en-US"/>
           </a:p>
         </p:txBody>
       </p:sp>
@@ -2010,7 +2089,7 @@
           <a:p>
             <a:pPr lvl="0" eaLnBrk="1" latinLnBrk="0" hangingPunct="1"/>
             <a:r>
-              <a:rPr kumimoji="0" lang="en-US" smtClean="0"/>
+              <a:rPr kumimoji="0" lang="en-US"/>
               <a:t>Click to edit Master text styles</a:t>
             </a:r>
           </a:p>
@@ -2064,7 +2143,7 @@
           <a:p>
             <a:pPr lvl="0" eaLnBrk="1" latinLnBrk="0" hangingPunct="1"/>
             <a:r>
-              <a:rPr kumimoji="0" lang="en-US" smtClean="0"/>
+              <a:rPr kumimoji="0" lang="en-US"/>
               <a:t>Click to edit Master text styles</a:t>
             </a:r>
           </a:p>
@@ -2108,35 +2187,35 @@
           <a:p>
             <a:pPr lvl="0" eaLnBrk="1" latinLnBrk="0" hangingPunct="1"/>
             <a:r>
-              <a:rPr lang="en-US" smtClean="0"/>
+              <a:rPr lang="en-US"/>
               <a:t>Click to edit Master text styles</a:t>
             </a:r>
           </a:p>
           <a:p>
             <a:pPr lvl="1" eaLnBrk="1" latinLnBrk="0" hangingPunct="1"/>
             <a:r>
-              <a:rPr lang="en-US" smtClean="0"/>
+              <a:rPr lang="en-US"/>
               <a:t>Second level</a:t>
             </a:r>
           </a:p>
           <a:p>
             <a:pPr lvl="2" eaLnBrk="1" latinLnBrk="0" hangingPunct="1"/>
             <a:r>
-              <a:rPr lang="en-US" smtClean="0"/>
+              <a:rPr lang="en-US"/>
               <a:t>Third level</a:t>
             </a:r>
           </a:p>
           <a:p>
             <a:pPr lvl="3" eaLnBrk="1" latinLnBrk="0" hangingPunct="1"/>
             <a:r>
-              <a:rPr lang="en-US" smtClean="0"/>
+              <a:rPr lang="en-US"/>
               <a:t>Fourth level</a:t>
             </a:r>
           </a:p>
           <a:p>
             <a:pPr lvl="4" eaLnBrk="1" latinLnBrk="0" hangingPunct="1"/>
             <a:r>
-              <a:rPr lang="en-US" smtClean="0"/>
+              <a:rPr lang="en-US"/>
               <a:t>Fifth level</a:t>
             </a:r>
             <a:endParaRPr kumimoji="0" lang="en-US"/>
@@ -2181,35 +2260,35 @@
           <a:p>
             <a:pPr lvl="0" eaLnBrk="1" latinLnBrk="0" hangingPunct="1"/>
             <a:r>
-              <a:rPr lang="en-US" smtClean="0"/>
+              <a:rPr lang="en-US"/>
               <a:t>Click to edit Master text styles</a:t>
             </a:r>
           </a:p>
           <a:p>
             <a:pPr lvl="1" eaLnBrk="1" latinLnBrk="0" hangingPunct="1"/>
             <a:r>
-              <a:rPr lang="en-US" smtClean="0"/>
+              <a:rPr lang="en-US"/>
               <a:t>Second level</a:t>
             </a:r>
           </a:p>
           <a:p>
             <a:pPr lvl="2" eaLnBrk="1" latinLnBrk="0" hangingPunct="1"/>
             <a:r>
-              <a:rPr lang="en-US" smtClean="0"/>
+              <a:rPr lang="en-US"/>
               <a:t>Third level</a:t>
             </a:r>
           </a:p>
           <a:p>
             <a:pPr lvl="3" eaLnBrk="1" latinLnBrk="0" hangingPunct="1"/>
             <a:r>
-              <a:rPr lang="en-US" smtClean="0"/>
+              <a:rPr lang="en-US"/>
               <a:t>Fourth level</a:t>
             </a:r>
           </a:p>
           <a:p>
             <a:pPr lvl="4" eaLnBrk="1" latinLnBrk="0" hangingPunct="1"/>
             <a:r>
-              <a:rPr lang="en-US" smtClean="0"/>
+              <a:rPr lang="en-US"/>
               <a:t>Fifth level</a:t>
             </a:r>
             <a:endParaRPr kumimoji="0" lang="en-US"/>
@@ -2233,7 +2312,7 @@
           <a:p>
             <a:fld id="{26825709-43EF-470A-8E41-672EB20A7A8D}" type="datetime12">
               <a:rPr lang="en-US" smtClean="0"/>
-              <a:t>2:42 PM</a:t>
+              <a:t>12:23 AM</a:t>
             </a:fld>
             <a:endParaRPr lang="en-US" dirty="0"/>
           </a:p>
@@ -2255,10 +2334,9 @@
           <a:lstStyle/>
           <a:p>
             <a:r>
-              <a:rPr lang="en-US" dirty="0" smtClean="0"/>
+              <a:rPr lang="en-US" dirty="0"/>
               <a:t>Carlos H. Borca</a:t>
             </a:r>
-            <a:endParaRPr lang="en-US" dirty="0"/>
           </a:p>
         </p:txBody>
       </p:sp>
@@ -2375,10 +2453,9 @@
           </a:lstStyle>
           <a:p>
             <a:r>
-              <a:rPr kumimoji="0" lang="en-US" smtClean="0"/>
+              <a:rPr kumimoji="0" lang="en-US"/>
               <a:t>Click to edit Master title style</a:t>
             </a:r>
-            <a:endParaRPr kumimoji="0" lang="en-US"/>
           </a:p>
         </p:txBody>
       </p:sp>
@@ -2399,7 +2476,7 @@
           <a:p>
             <a:fld id="{542A77ED-B94B-4871-BDF3-4CDFC26A2499}" type="datetime12">
               <a:rPr lang="en-US" smtClean="0"/>
-              <a:t>2:42 PM</a:t>
+              <a:t>12:23 AM</a:t>
             </a:fld>
             <a:endParaRPr lang="en-US" dirty="0"/>
           </a:p>
@@ -2421,10 +2498,9 @@
           <a:lstStyle/>
           <a:p>
             <a:r>
-              <a:rPr lang="en-US" dirty="0" smtClean="0"/>
+              <a:rPr lang="en-US" dirty="0"/>
               <a:t>Carlos H. Borca</a:t>
             </a:r>
-            <a:endParaRPr lang="en-US" dirty="0"/>
           </a:p>
         </p:txBody>
       </p:sp>
@@ -2505,7 +2581,7 @@
           <a:p>
             <a:fld id="{74FF3B90-6FDE-45A9-BC95-EB52BB856063}" type="datetime12">
               <a:rPr lang="en-US" smtClean="0"/>
-              <a:t>2:42 PM</a:t>
+              <a:t>12:23 AM</a:t>
             </a:fld>
             <a:endParaRPr lang="en-US" dirty="0"/>
           </a:p>
@@ -2527,10 +2603,9 @@
           <a:lstStyle/>
           <a:p>
             <a:r>
-              <a:rPr lang="en-US" dirty="0" smtClean="0"/>
+              <a:rPr lang="en-US" dirty="0"/>
               <a:t>Carlos H. Borca</a:t>
             </a:r>
-            <a:endParaRPr lang="en-US" dirty="0"/>
           </a:p>
         </p:txBody>
       </p:sp>
@@ -2636,10 +2711,9 @@
           </a:lstStyle>
           <a:p>
             <a:r>
-              <a:rPr kumimoji="0" lang="en-US" smtClean="0"/>
+              <a:rPr kumimoji="0" lang="en-US"/>
               <a:t>Click to edit Master title style</a:t>
             </a:r>
-            <a:endParaRPr kumimoji="0" lang="en-US"/>
           </a:p>
         </p:txBody>
       </p:sp>
@@ -2686,7 +2760,7 @@
           <a:p>
             <a:pPr lvl="0" eaLnBrk="1" latinLnBrk="0" hangingPunct="1"/>
             <a:r>
-              <a:rPr kumimoji="0" lang="en-US" smtClean="0"/>
+              <a:rPr kumimoji="0" lang="en-US"/>
               <a:t>Click to edit Master text styles</a:t>
             </a:r>
           </a:p>
@@ -2730,35 +2804,35 @@
           <a:p>
             <a:pPr lvl="0" eaLnBrk="1" latinLnBrk="0" hangingPunct="1"/>
             <a:r>
-              <a:rPr lang="en-US" smtClean="0"/>
+              <a:rPr lang="en-US"/>
               <a:t>Click to edit Master text styles</a:t>
             </a:r>
           </a:p>
           <a:p>
             <a:pPr lvl="1" eaLnBrk="1" latinLnBrk="0" hangingPunct="1"/>
             <a:r>
-              <a:rPr lang="en-US" smtClean="0"/>
+              <a:rPr lang="en-US"/>
               <a:t>Second level</a:t>
             </a:r>
           </a:p>
           <a:p>
             <a:pPr lvl="2" eaLnBrk="1" latinLnBrk="0" hangingPunct="1"/>
             <a:r>
-              <a:rPr lang="en-US" smtClean="0"/>
+              <a:rPr lang="en-US"/>
               <a:t>Third level</a:t>
             </a:r>
           </a:p>
           <a:p>
             <a:pPr lvl="3" eaLnBrk="1" latinLnBrk="0" hangingPunct="1"/>
             <a:r>
-              <a:rPr lang="en-US" smtClean="0"/>
+              <a:rPr lang="en-US"/>
               <a:t>Fourth level</a:t>
             </a:r>
           </a:p>
           <a:p>
             <a:pPr lvl="4" eaLnBrk="1" latinLnBrk="0" hangingPunct="1"/>
             <a:r>
-              <a:rPr lang="en-US" smtClean="0"/>
+              <a:rPr lang="en-US"/>
               <a:t>Fifth level</a:t>
             </a:r>
             <a:endParaRPr kumimoji="0" lang="en-US"/>
@@ -2782,7 +2856,7 @@
           <a:p>
             <a:fld id="{D683E704-2A04-4A09-9EC8-A3BF9D1B0721}" type="datetime12">
               <a:rPr lang="en-US" smtClean="0"/>
-              <a:t>2:42 PM</a:t>
+              <a:t>12:23 AM</a:t>
             </a:fld>
             <a:endParaRPr lang="en-US" dirty="0"/>
           </a:p>
@@ -2804,10 +2878,9 @@
           <a:lstStyle/>
           <a:p>
             <a:r>
-              <a:rPr lang="en-US" dirty="0" smtClean="0"/>
+              <a:rPr lang="en-US" dirty="0"/>
               <a:t>Carlos H. Borca</a:t>
             </a:r>
-            <a:endParaRPr lang="en-US" dirty="0"/>
           </a:p>
         </p:txBody>
       </p:sp>
@@ -3013,10 +3086,9 @@
           </a:lstStyle>
           <a:p>
             <a:r>
-              <a:rPr kumimoji="0" lang="en-US" smtClean="0"/>
+              <a:rPr kumimoji="0" lang="en-US"/>
               <a:t>Click to edit Master title style</a:t>
             </a:r>
-            <a:endParaRPr kumimoji="0" lang="en-US"/>
           </a:p>
         </p:txBody>
       </p:sp>
@@ -3063,7 +3135,7 @@
           <a:p>
             <a:pPr lvl="0" eaLnBrk="1" latinLnBrk="0" hangingPunct="1"/>
             <a:r>
-              <a:rPr kumimoji="0" lang="en-US" smtClean="0"/>
+              <a:rPr kumimoji="0" lang="en-US"/>
               <a:t>Click to edit Master text styles</a:t>
             </a:r>
           </a:p>
@@ -3086,7 +3158,7 @@
           <a:p>
             <a:fld id="{A2F15518-8DCD-46C4-9857-30A40E7F1F36}" type="datetime12">
               <a:rPr lang="en-US" smtClean="0"/>
-              <a:t>2:42 PM</a:t>
+              <a:t>12:23 AM</a:t>
             </a:fld>
             <a:endParaRPr lang="en-US" dirty="0"/>
           </a:p>
@@ -3108,10 +3180,9 @@
           <a:lstStyle/>
           <a:p>
             <a:r>
-              <a:rPr lang="en-US" dirty="0" smtClean="0"/>
+              <a:rPr lang="en-US" dirty="0"/>
               <a:t>Carlos H. Borca</a:t>
             </a:r>
-            <a:endParaRPr lang="en-US" dirty="0"/>
           </a:p>
         </p:txBody>
       </p:sp>
@@ -3182,10 +3253,9 @@
           </a:lstStyle>
           <a:p>
             <a:r>
-              <a:rPr kumimoji="0" lang="en-US" dirty="0" smtClean="0"/>
+              <a:rPr kumimoji="0" lang="en-US" dirty="0"/>
               <a:t>Click icon to add picture</a:t>
             </a:r>
-            <a:endParaRPr kumimoji="0" lang="en-US" dirty="0"/>
           </a:p>
         </p:txBody>
       </p:sp>
@@ -3769,10 +3839,9 @@
           <a:lstStyle/>
           <a:p>
             <a:r>
-              <a:rPr kumimoji="0" lang="en-US" smtClean="0"/>
+              <a:rPr kumimoji="0" lang="en-US"/>
               <a:t>Click to edit Master title style</a:t>
             </a:r>
-            <a:endParaRPr kumimoji="0" lang="en-US"/>
           </a:p>
         </p:txBody>
       </p:sp>
@@ -3803,38 +3872,37 @@
           <a:p>
             <a:pPr lvl="0" eaLnBrk="1" latinLnBrk="0" hangingPunct="1"/>
             <a:r>
-              <a:rPr kumimoji="0" lang="en-US" smtClean="0"/>
+              <a:rPr kumimoji="0" lang="en-US"/>
               <a:t>Click to edit Master text styles</a:t>
             </a:r>
           </a:p>
           <a:p>
             <a:pPr lvl="1" eaLnBrk="1" latinLnBrk="0" hangingPunct="1"/>
             <a:r>
-              <a:rPr kumimoji="0" lang="en-US" smtClean="0"/>
+              <a:rPr kumimoji="0" lang="en-US"/>
               <a:t>Second level</a:t>
             </a:r>
           </a:p>
           <a:p>
             <a:pPr lvl="2" eaLnBrk="1" latinLnBrk="0" hangingPunct="1"/>
             <a:r>
-              <a:rPr kumimoji="0" lang="en-US" smtClean="0"/>
+              <a:rPr kumimoji="0" lang="en-US"/>
               <a:t>Third level</a:t>
             </a:r>
           </a:p>
           <a:p>
             <a:pPr lvl="3" eaLnBrk="1" latinLnBrk="0" hangingPunct="1"/>
             <a:r>
-              <a:rPr kumimoji="0" lang="en-US" smtClean="0"/>
+              <a:rPr kumimoji="0" lang="en-US"/>
               <a:t>Fourth level</a:t>
             </a:r>
           </a:p>
           <a:p>
             <a:pPr lvl="4" eaLnBrk="1" latinLnBrk="0" hangingPunct="1"/>
             <a:r>
-              <a:rPr kumimoji="0" lang="en-US" smtClean="0"/>
+              <a:rPr kumimoji="0" lang="en-US"/>
               <a:t>Fifth level</a:t>
             </a:r>
-            <a:endParaRPr kumimoji="0" lang="en-US"/>
           </a:p>
         </p:txBody>
       </p:sp>
@@ -3873,7 +3941,7 @@
           <a:p>
             <a:fld id="{3E274671-4571-4D3D-B546-3CBC7B697089}" type="datetime12">
               <a:rPr lang="en-US" smtClean="0"/>
-              <a:t>2:42 PM</a:t>
+              <a:t>12:23 AM</a:t>
             </a:fld>
             <a:endParaRPr lang="en-US" dirty="0"/>
           </a:p>
@@ -3913,10 +3981,9 @@
           </a:lstStyle>
           <a:p>
             <a:r>
-              <a:rPr lang="en-US" dirty="0" smtClean="0"/>
+              <a:rPr lang="en-US" dirty="0"/>
               <a:t>Carlos H. Borca</a:t>
             </a:r>
-            <a:endParaRPr lang="en-US" dirty="0"/>
           </a:p>
         </p:txBody>
       </p:sp>
@@ -4532,7 +4599,7 @@
           <a:p>
             <a:pPr algn="ctr"/>
             <a:r>
-              <a:rPr lang="en-US" sz="17400" dirty="0" smtClean="0">
+              <a:rPr lang="en-US" sz="17400" dirty="0">
                 <a:effectLst>
                   <a:outerShdw blurRad="38100" dist="38100" dir="2700000" algn="tl">
                     <a:srgbClr val="000000">
@@ -4547,7 +4614,7 @@
               <a:t>Carlos </a:t>
             </a:r>
             <a:r>
-              <a:rPr lang="en-US" sz="17400" dirty="0" err="1" smtClean="0">
+              <a:rPr lang="en-US" sz="17400" dirty="0" err="1">
                 <a:effectLst>
                   <a:outerShdw blurRad="38100" dist="38100" dir="2700000" algn="tl">
                     <a:srgbClr val="000000">
@@ -4562,7 +4629,7 @@
               <a:t>Hernán</a:t>
             </a:r>
             <a:r>
-              <a:rPr lang="en-US" sz="17400" dirty="0" smtClean="0">
+              <a:rPr lang="en-US" sz="17400" dirty="0">
                 <a:effectLst>
                   <a:outerShdw blurRad="38100" dist="38100" dir="2700000" algn="tl">
                     <a:srgbClr val="000000">
@@ -4576,23 +4643,11 @@
               </a:rPr>
               <a:t> Borca Paredes</a:t>
             </a:r>
-            <a:endParaRPr lang="en-US" sz="17400" dirty="0" smtClean="0">
-              <a:effectLst>
-                <a:outerShdw blurRad="38100" dist="38100" dir="2700000" algn="tl">
-                  <a:srgbClr val="000000">
-                    <a:alpha val="43137"/>
-                  </a:srgbClr>
-                </a:outerShdw>
-              </a:effectLst>
-              <a:latin typeface="Ebrima" pitchFamily="2" charset="0"/>
-              <a:ea typeface="Ebrima" pitchFamily="2" charset="0"/>
-              <a:cs typeface="Ebrima" pitchFamily="2" charset="0"/>
-            </a:endParaRPr>
           </a:p>
           <a:p>
             <a:pPr algn="ctr"/>
             <a:r>
-              <a:rPr lang="en-US" sz="11100" dirty="0" err="1" smtClean="0">
+              <a:rPr lang="en-US" sz="11100" dirty="0" err="1">
                 <a:effectLst>
                   <a:outerShdw blurRad="38100" dist="38100" dir="2700000" algn="tl">
                     <a:srgbClr val="000000">
@@ -4607,7 +4662,7 @@
               <a:t>Químico</a:t>
             </a:r>
             <a:r>
-              <a:rPr lang="en-US" sz="11100" dirty="0" smtClean="0">
+              <a:rPr lang="en-US" sz="11100" dirty="0">
                 <a:effectLst>
                   <a:outerShdw blurRad="38100" dist="38100" dir="2700000" algn="tl">
                     <a:srgbClr val="000000">
@@ -4622,7 +4677,7 @@
               <a:t> </a:t>
             </a:r>
             <a:r>
-              <a:rPr lang="en-US" sz="11100" dirty="0" err="1" smtClean="0">
+              <a:rPr lang="en-US" sz="11100" dirty="0" err="1">
                 <a:effectLst>
                   <a:outerShdw blurRad="38100" dist="38100" dir="2700000" algn="tl">
                     <a:srgbClr val="000000">
@@ -4637,7 +4692,7 @@
               <a:t>Teórico</a:t>
             </a:r>
             <a:r>
-              <a:rPr lang="en-US" sz="11100" dirty="0" smtClean="0">
+              <a:rPr lang="en-US" sz="11100" dirty="0">
                 <a:effectLst>
                   <a:outerShdw blurRad="38100" dist="38100" dir="2700000" algn="tl">
                     <a:srgbClr val="000000">
@@ -4652,7 +4707,7 @@
               <a:t> y </a:t>
             </a:r>
             <a:r>
-              <a:rPr lang="en-US" sz="11100" dirty="0" err="1" smtClean="0">
+              <a:rPr lang="en-US" sz="11100" dirty="0" err="1">
                 <a:effectLst>
                   <a:outerShdw blurRad="38100" dist="38100" dir="2700000" algn="tl">
                     <a:srgbClr val="000000">
@@ -4681,6 +4736,299 @@
           </a:p>
         </p:txBody>
       </p:sp>
+    </p:spTree>
+    <p:extLst>
+      <p:ext uri="{BB962C8B-B14F-4D97-AF65-F5344CB8AC3E}">
+        <p14:creationId xmlns:p14="http://schemas.microsoft.com/office/powerpoint/2010/main" val="1755383272"/>
+      </p:ext>
+    </p:extLst>
+  </p:cSld>
+  <p:clrMapOvr>
+    <a:masterClrMapping/>
+  </p:clrMapOvr>
+  <mc:AlternateContent xmlns:mc="http://schemas.openxmlformats.org/markup-compatibility/2006" xmlns:p14="http://schemas.microsoft.com/office/powerpoint/2010/main">
+    <mc:Choice Requires="p14">
+      <p:transition spd="med" p14:dur="700">
+        <p:fade/>
+      </p:transition>
+    </mc:Choice>
+    <mc:Fallback xmlns="">
+      <p:transition spd="med">
+        <p:fade/>
+      </p:transition>
+    </mc:Fallback>
+  </mc:AlternateContent>
+</p:sld>
+</file>
+
+<file path=ppt/slides/slide2.xml><?xml version="1.0" encoding="utf-8"?>
+<p:sld xmlns:a="http://schemas.openxmlformats.org/drawingml/2006/main" xmlns:r="http://schemas.openxmlformats.org/officeDocument/2006/relationships" xmlns:p="http://schemas.openxmlformats.org/presentationml/2006/main">
+  <p:cSld>
+    <p:spTree>
+      <p:nvGrpSpPr>
+        <p:cNvPr id="1" name=""/>
+        <p:cNvGrpSpPr/>
+        <p:nvPr/>
+      </p:nvGrpSpPr>
+      <p:grpSpPr>
+        <a:xfrm>
+          <a:off x="0" y="0"/>
+          <a:ext cx="0" cy="0"/>
+          <a:chOff x="0" y="0"/>
+          <a:chExt cx="0" cy="0"/>
+        </a:xfrm>
+      </p:grpSpPr>
+      <p:sp>
+        <p:nvSpPr>
+          <p:cNvPr id="2" name="TextBox 1"/>
+          <p:cNvSpPr txBox="1"/>
+          <p:nvPr/>
+        </p:nvSpPr>
+        <p:spPr>
+          <a:xfrm>
+            <a:off x="0" y="496120"/>
+            <a:ext cx="51206400" cy="4539704"/>
+          </a:xfrm>
+          <a:prstGeom prst="rect">
+            <a:avLst/>
+          </a:prstGeom>
+          <a:noFill/>
+        </p:spPr>
+        <p:txBody>
+          <a:bodyPr wrap="square" rtlCol="0">
+            <a:spAutoFit/>
+          </a:bodyPr>
+          <a:lstStyle/>
+          <a:p>
+            <a:pPr algn="ctr"/>
+            <a:r>
+              <a:rPr lang="en-US" sz="17400" dirty="0">
+                <a:effectLst>
+                  <a:outerShdw blurRad="38100" dist="38100" dir="2700000" algn="tl">
+                    <a:srgbClr val="000000">
+                      <a:alpha val="43137"/>
+                    </a:srgbClr>
+                  </a:outerShdw>
+                </a:effectLst>
+                <a:latin typeface="Ebrima" pitchFamily="2" charset="0"/>
+                <a:ea typeface="Ebrima" pitchFamily="2" charset="0"/>
+                <a:cs typeface="Ebrima" pitchFamily="2" charset="0"/>
+              </a:rPr>
+              <a:t>Carlos </a:t>
+            </a:r>
+            <a:r>
+              <a:rPr lang="en-US" sz="17400" dirty="0" err="1">
+                <a:effectLst>
+                  <a:outerShdw blurRad="38100" dist="38100" dir="2700000" algn="tl">
+                    <a:srgbClr val="000000">
+                      <a:alpha val="43137"/>
+                    </a:srgbClr>
+                  </a:outerShdw>
+                </a:effectLst>
+                <a:latin typeface="Ebrima" pitchFamily="2" charset="0"/>
+                <a:ea typeface="Ebrima" pitchFamily="2" charset="0"/>
+                <a:cs typeface="Ebrima" pitchFamily="2" charset="0"/>
+              </a:rPr>
+              <a:t>Hernán</a:t>
+            </a:r>
+            <a:r>
+              <a:rPr lang="en-US" sz="17400" dirty="0">
+                <a:effectLst>
+                  <a:outerShdw blurRad="38100" dist="38100" dir="2700000" algn="tl">
+                    <a:srgbClr val="000000">
+                      <a:alpha val="43137"/>
+                    </a:srgbClr>
+                  </a:outerShdw>
+                </a:effectLst>
+                <a:latin typeface="Ebrima" pitchFamily="2" charset="0"/>
+                <a:ea typeface="Ebrima" pitchFamily="2" charset="0"/>
+                <a:cs typeface="Ebrima" pitchFamily="2" charset="0"/>
+              </a:rPr>
+              <a:t> Borca Paredes</a:t>
+            </a:r>
+          </a:p>
+          <a:p>
+            <a:pPr algn="ctr"/>
+            <a:r>
+              <a:rPr lang="en-US" sz="11100" dirty="0" err="1">
+                <a:solidFill>
+                  <a:srgbClr val="CC9900"/>
+                </a:solidFill>
+                <a:effectLst>
+                  <a:outerShdw blurRad="38100" dist="38100" dir="2700000" algn="tl">
+                    <a:srgbClr val="000000">
+                      <a:alpha val="43137"/>
+                    </a:srgbClr>
+                  </a:outerShdw>
+                </a:effectLst>
+                <a:latin typeface="Ebrima" pitchFamily="2" charset="0"/>
+                <a:ea typeface="Ebrima" pitchFamily="2" charset="0"/>
+                <a:cs typeface="Ebrima" pitchFamily="2" charset="0"/>
+              </a:rPr>
+              <a:t>Químico</a:t>
+            </a:r>
+            <a:r>
+              <a:rPr lang="en-US" sz="11100" dirty="0">
+                <a:solidFill>
+                  <a:srgbClr val="CC9900"/>
+                </a:solidFill>
+                <a:effectLst>
+                  <a:outerShdw blurRad="38100" dist="38100" dir="2700000" algn="tl">
+                    <a:srgbClr val="000000">
+                      <a:alpha val="43137"/>
+                    </a:srgbClr>
+                  </a:outerShdw>
+                </a:effectLst>
+                <a:latin typeface="Ebrima" pitchFamily="2" charset="0"/>
+                <a:ea typeface="Ebrima" pitchFamily="2" charset="0"/>
+                <a:cs typeface="Ebrima" pitchFamily="2" charset="0"/>
+              </a:rPr>
+              <a:t> </a:t>
+            </a:r>
+            <a:r>
+              <a:rPr lang="en-US" sz="11100" dirty="0" err="1">
+                <a:solidFill>
+                  <a:srgbClr val="CC9900"/>
+                </a:solidFill>
+                <a:effectLst>
+                  <a:outerShdw blurRad="38100" dist="38100" dir="2700000" algn="tl">
+                    <a:srgbClr val="000000">
+                      <a:alpha val="43137"/>
+                    </a:srgbClr>
+                  </a:outerShdw>
+                </a:effectLst>
+                <a:latin typeface="Ebrima" pitchFamily="2" charset="0"/>
+                <a:ea typeface="Ebrima" pitchFamily="2" charset="0"/>
+                <a:cs typeface="Ebrima" pitchFamily="2" charset="0"/>
+              </a:rPr>
+              <a:t>Teórico</a:t>
+            </a:r>
+            <a:r>
+              <a:rPr lang="en-US" sz="11100" dirty="0">
+                <a:solidFill>
+                  <a:srgbClr val="CC9900"/>
+                </a:solidFill>
+                <a:effectLst>
+                  <a:outerShdw blurRad="38100" dist="38100" dir="2700000" algn="tl">
+                    <a:srgbClr val="000000">
+                      <a:alpha val="43137"/>
+                    </a:srgbClr>
+                  </a:outerShdw>
+                </a:effectLst>
+                <a:latin typeface="Ebrima" pitchFamily="2" charset="0"/>
+                <a:ea typeface="Ebrima" pitchFamily="2" charset="0"/>
+                <a:cs typeface="Ebrima" pitchFamily="2" charset="0"/>
+              </a:rPr>
+              <a:t> y </a:t>
+            </a:r>
+            <a:r>
+              <a:rPr lang="en-US" sz="11100" dirty="0" err="1">
+                <a:solidFill>
+                  <a:srgbClr val="CC9900"/>
+                </a:solidFill>
+                <a:effectLst>
+                  <a:outerShdw blurRad="38100" dist="38100" dir="2700000" algn="tl">
+                    <a:srgbClr val="000000">
+                      <a:alpha val="43137"/>
+                    </a:srgbClr>
+                  </a:outerShdw>
+                </a:effectLst>
+                <a:latin typeface="Ebrima" pitchFamily="2" charset="0"/>
+                <a:ea typeface="Ebrima" pitchFamily="2" charset="0"/>
+                <a:cs typeface="Ebrima" pitchFamily="2" charset="0"/>
+              </a:rPr>
+              <a:t>Computacional</a:t>
+            </a:r>
+            <a:endParaRPr lang="en-US" sz="11100" dirty="0">
+              <a:solidFill>
+                <a:srgbClr val="CC9900"/>
+              </a:solidFill>
+              <a:effectLst>
+                <a:outerShdw blurRad="38100" dist="38100" dir="2700000" algn="tl">
+                  <a:srgbClr val="000000">
+                    <a:alpha val="43137"/>
+                  </a:srgbClr>
+                </a:outerShdw>
+              </a:effectLst>
+              <a:latin typeface="Ebrima" pitchFamily="2" charset="0"/>
+              <a:ea typeface="Ebrima" pitchFamily="2" charset="0"/>
+              <a:cs typeface="Ebrima" pitchFamily="2" charset="0"/>
+            </a:endParaRPr>
+          </a:p>
+        </p:txBody>
+      </p:sp>
+      <p:pic>
+        <p:nvPicPr>
+          <p:cNvPr id="3" name="Picture 2">
+            <a:extLst>
+              <a:ext uri="{FF2B5EF4-FFF2-40B4-BE49-F238E27FC236}">
+                <a16:creationId xmlns:a16="http://schemas.microsoft.com/office/drawing/2014/main" id="{DE232315-99B4-4AFA-A720-9CBF3028094C}"/>
+              </a:ext>
+            </a:extLst>
+          </p:cNvPr>
+          <p:cNvPicPr>
+            <a:picLocks noChangeAspect="1"/>
+          </p:cNvPicPr>
+          <p:nvPr/>
+        </p:nvPicPr>
+        <p:blipFill>
+          <a:blip r:embed="rId3">
+            <a:extLst>
+              <a:ext uri="{28A0092B-C50C-407E-A947-70E740481C1C}">
+                <a14:useLocalDpi xmlns:a14="http://schemas.microsoft.com/office/drawing/2010/main" val="0"/>
+              </a:ext>
+            </a:extLst>
+          </a:blip>
+          <a:stretch>
+            <a:fillRect/>
+          </a:stretch>
+        </p:blipFill>
+        <p:spPr>
+          <a:xfrm>
+            <a:off x="5646022" y="457200"/>
+            <a:ext cx="4313903" cy="4114800"/>
+          </a:xfrm>
+          <a:prstGeom prst="rect">
+            <a:avLst/>
+          </a:prstGeom>
+        </p:spPr>
+      </p:pic>
+      <p:pic>
+        <p:nvPicPr>
+          <p:cNvPr id="8" name="Picture 7">
+            <a:extLst>
+              <a:ext uri="{FF2B5EF4-FFF2-40B4-BE49-F238E27FC236}">
+                <a16:creationId xmlns:a16="http://schemas.microsoft.com/office/drawing/2014/main" id="{78B6924D-93E1-4C31-919E-057D8B0C3354}"/>
+              </a:ext>
+            </a:extLst>
+          </p:cNvPr>
+          <p:cNvPicPr>
+            <a:picLocks noChangeAspect="1"/>
+          </p:cNvPicPr>
+          <p:nvPr/>
+        </p:nvPicPr>
+        <p:blipFill>
+          <a:blip r:embed="rId4">
+            <a:extLst>
+              <a:ext uri="{28A0092B-C50C-407E-A947-70E740481C1C}">
+                <a14:useLocalDpi xmlns:a14="http://schemas.microsoft.com/office/drawing/2010/main" val="0"/>
+              </a:ext>
+            </a:extLst>
+          </a:blip>
+          <a:stretch>
+            <a:fillRect/>
+          </a:stretch>
+        </p:blipFill>
+        <p:spPr>
+          <a:xfrm flipH="1">
+            <a:off x="41605200" y="731520"/>
+            <a:ext cx="4053561" cy="3657600"/>
+          </a:xfrm>
+          <a:prstGeom prst="rect">
+            <a:avLst/>
+          </a:prstGeom>
+        </p:spPr>
+      </p:pic>
     </p:spTree>
     <p:extLst>
       <p:ext uri="{BB962C8B-B14F-4D97-AF65-F5344CB8AC3E}">
@@ -4703,13 +5051,6 @@
       </p:transition>
     </mc:Fallback>
   </mc:AlternateContent>
-  <p:timing>
-    <p:tnLst>
-      <p:par>
-        <p:cTn id="1" dur="indefinite" restart="never" nodeType="tmRoot"/>
-      </p:par>
-    </p:tnLst>
-  </p:timing>
 </p:sld>
 </file>
 

</xml_diff>

<commit_message>
Update original header and footer files
</commit_message>
<xml_diff>
--- a/design/encabezado.pptx
+++ b/design/encabezado.pptx
@@ -8,8 +8,8 @@
     <p:notesMasterId r:id="rId4"/>
   </p:notesMasterIdLst>
   <p:sldIdLst>
-    <p:sldId id="269" r:id="rId2"/>
-    <p:sldId id="268" r:id="rId3"/>
+    <p:sldId id="268" r:id="rId2"/>
+    <p:sldId id="269" r:id="rId3"/>
   </p:sldIdLst>
   <p:sldSz cx="51206400" cy="28803600"/>
   <p:notesSz cx="6858000" cy="9144000"/>
@@ -137,10 +137,6 @@
 </p:presentation>
 </file>
 
-<file path=ppt/revisionInfo.xml><?xml version="1.0" encoding="utf-8"?>
-<p1510:revInfo xmlns:a="http://schemas.openxmlformats.org/drawingml/2006/main" xmlns:r="http://schemas.openxmlformats.org/officeDocument/2006/relationships" xmlns:p1510="http://schemas.microsoft.com/office/powerpoint/2015/10/main"/>
-</file>
-
 <file path=ppt/notesMasters/notesMaster1.xml><?xml version="1.0" encoding="utf-8"?>
 <p:notesMaster xmlns:a="http://schemas.openxmlformats.org/drawingml/2006/main" xmlns:r="http://schemas.openxmlformats.org/officeDocument/2006/relationships" xmlns:p="http://schemas.openxmlformats.org/presentationml/2006/main">
   <p:cSld>
@@ -223,7 +219,7 @@
           <a:p>
             <a:fld id="{A9FE03EE-1C82-4E99-9DF8-4A05B170F250}" type="datetimeFigureOut">
               <a:rPr lang="en-US" smtClean="0"/>
-              <a:t>1/28/2018</a:t>
+              <a:t>2/26/2020</a:t>
             </a:fld>
             <a:endParaRPr lang="en-US" dirty="0"/>
           </a:p>
@@ -569,7 +565,7 @@
     </p:spTree>
     <p:extLst>
       <p:ext uri="{BB962C8B-B14F-4D97-AF65-F5344CB8AC3E}">
-        <p14:creationId xmlns:p14="http://schemas.microsoft.com/office/powerpoint/2010/main" val="4275012963"/>
+        <p14:creationId xmlns:p14="http://schemas.microsoft.com/office/powerpoint/2010/main" val="3825422103"/>
       </p:ext>
     </p:extLst>
   </p:cSld>
@@ -658,7 +654,7 @@
     </p:spTree>
     <p:extLst>
       <p:ext uri="{BB962C8B-B14F-4D97-AF65-F5344CB8AC3E}">
-        <p14:creationId xmlns:p14="http://schemas.microsoft.com/office/powerpoint/2010/main" val="3825422103"/>
+        <p14:creationId xmlns:p14="http://schemas.microsoft.com/office/powerpoint/2010/main" val="1049185151"/>
       </p:ext>
     </p:extLst>
   </p:cSld>
@@ -839,7 +835,7 @@
           <a:p>
             <a:fld id="{D44D2351-1F20-4245-B389-419D0CB28AFC}" type="datetime12">
               <a:rPr lang="en-US" smtClean="0"/>
-              <a:t>12:23 AM</a:t>
+              <a:t>1:16 AM</a:t>
             </a:fld>
             <a:endParaRPr lang="en-US" dirty="0"/>
           </a:p>
@@ -1018,7 +1014,7 @@
           <a:p>
             <a:fld id="{7E522AC0-2225-44D5-85DD-69FF70C3BCA3}" type="datetime12">
               <a:rPr lang="en-US" smtClean="0"/>
-              <a:t>12:23 AM</a:t>
+              <a:t>1:16 AM</a:t>
             </a:fld>
             <a:endParaRPr lang="en-US" dirty="0"/>
           </a:p>
@@ -1207,7 +1203,7 @@
           <a:p>
             <a:fld id="{4E7D4F7B-3389-415B-B217-40891253FD77}" type="datetime12">
               <a:rPr lang="en-US" smtClean="0"/>
-              <a:t>12:23 AM</a:t>
+              <a:t>1:16 AM</a:t>
             </a:fld>
             <a:endParaRPr lang="en-US" dirty="0"/>
           </a:p>
@@ -1386,7 +1382,7 @@
           <a:p>
             <a:fld id="{A289EB68-F6EE-4E9A-BB3F-5D7F535B883B}" type="datetime12">
               <a:rPr lang="en-US" smtClean="0"/>
-              <a:t>12:23 AM</a:t>
+              <a:t>1:16 AM</a:t>
             </a:fld>
             <a:endParaRPr lang="en-US" dirty="0"/>
           </a:p>
@@ -1642,7 +1638,7 @@
           <a:p>
             <a:fld id="{5ADCBF7E-A68A-42EE-9D9D-825A9A1291F2}" type="datetime12">
               <a:rPr lang="en-US" smtClean="0"/>
-              <a:t>12:23 AM</a:t>
+              <a:t>1:16 AM</a:t>
             </a:fld>
             <a:endParaRPr lang="en-US" dirty="0"/>
           </a:p>
@@ -1920,7 +1916,7 @@
           <a:p>
             <a:fld id="{D1637FC1-476F-4955-936A-6E8B672DC59D}" type="datetime12">
               <a:rPr lang="en-US" smtClean="0"/>
-              <a:t>12:23 AM</a:t>
+              <a:t>1:16 AM</a:t>
             </a:fld>
             <a:endParaRPr lang="en-US" dirty="0"/>
           </a:p>
@@ -2312,7 +2308,7 @@
           <a:p>
             <a:fld id="{26825709-43EF-470A-8E41-672EB20A7A8D}" type="datetime12">
               <a:rPr lang="en-US" smtClean="0"/>
-              <a:t>12:23 AM</a:t>
+              <a:t>1:16 AM</a:t>
             </a:fld>
             <a:endParaRPr lang="en-US" dirty="0"/>
           </a:p>
@@ -2476,7 +2472,7 @@
           <a:p>
             <a:fld id="{542A77ED-B94B-4871-BDF3-4CDFC26A2499}" type="datetime12">
               <a:rPr lang="en-US" smtClean="0"/>
-              <a:t>12:23 AM</a:t>
+              <a:t>1:16 AM</a:t>
             </a:fld>
             <a:endParaRPr lang="en-US" dirty="0"/>
           </a:p>
@@ -2581,7 +2577,7 @@
           <a:p>
             <a:fld id="{74FF3B90-6FDE-45A9-BC95-EB52BB856063}" type="datetime12">
               <a:rPr lang="en-US" smtClean="0"/>
-              <a:t>12:23 AM</a:t>
+              <a:t>1:16 AM</a:t>
             </a:fld>
             <a:endParaRPr lang="en-US" dirty="0"/>
           </a:p>
@@ -2856,7 +2852,7 @@
           <a:p>
             <a:fld id="{D683E704-2A04-4A09-9EC8-A3BF9D1B0721}" type="datetime12">
               <a:rPr lang="en-US" smtClean="0"/>
-              <a:t>12:23 AM</a:t>
+              <a:t>1:16 AM</a:t>
             </a:fld>
             <a:endParaRPr lang="en-US" dirty="0"/>
           </a:p>
@@ -3158,7 +3154,7 @@
           <a:p>
             <a:fld id="{A2F15518-8DCD-46C4-9857-30A40E7F1F36}" type="datetime12">
               <a:rPr lang="en-US" smtClean="0"/>
-              <a:t>12:23 AM</a:t>
+              <a:t>1:16 AM</a:t>
             </a:fld>
             <a:endParaRPr lang="en-US" dirty="0"/>
           </a:p>
@@ -3941,7 +3937,7 @@
           <a:p>
             <a:fld id="{3E274671-4571-4D3D-B546-3CBC7B697089}" type="datetime12">
               <a:rPr lang="en-US" smtClean="0"/>
-              <a:t>12:23 AM</a:t>
+              <a:t>1:16 AM</a:t>
             </a:fld>
             <a:endParaRPr lang="en-US" dirty="0"/>
           </a:p>
@@ -4641,7 +4637,37 @@
                 <a:ea typeface="Ebrima" pitchFamily="2" charset="0"/>
                 <a:cs typeface="Ebrima" pitchFamily="2" charset="0"/>
               </a:rPr>
-              <a:t> Borca Paredes</a:t>
+              <a:t> </a:t>
+            </a:r>
+            <a:r>
+              <a:rPr lang="en-US" sz="17400" dirty="0" err="1">
+                <a:effectLst>
+                  <a:outerShdw blurRad="38100" dist="38100" dir="2700000" algn="tl">
+                    <a:srgbClr val="000000">
+                      <a:alpha val="43137"/>
+                    </a:srgbClr>
+                  </a:outerShdw>
+                </a:effectLst>
+                <a:latin typeface="Ebrima" pitchFamily="2" charset="0"/>
+                <a:ea typeface="Ebrima" pitchFamily="2" charset="0"/>
+                <a:cs typeface="Ebrima" pitchFamily="2" charset="0"/>
+              </a:rPr>
+              <a:t>Borca</a:t>
+            </a:r>
+            <a:r>
+              <a:rPr lang="en-US" sz="17400" dirty="0">
+                <a:effectLst>
+                  <a:outerShdw blurRad="38100" dist="38100" dir="2700000" algn="tl">
+                    <a:srgbClr val="000000">
+                      <a:alpha val="43137"/>
+                    </a:srgbClr>
+                  </a:outerShdw>
+                </a:effectLst>
+                <a:latin typeface="Ebrima" pitchFamily="2" charset="0"/>
+                <a:ea typeface="Ebrima" pitchFamily="2" charset="0"/>
+                <a:cs typeface="Ebrima" pitchFamily="2" charset="0"/>
+              </a:rPr>
+              <a:t> Paredes</a:t>
             </a:r>
           </a:p>
           <a:p>
@@ -4739,7 +4765,7 @@
     </p:spTree>
     <p:extLst>
       <p:ext uri="{BB962C8B-B14F-4D97-AF65-F5344CB8AC3E}">
-        <p14:creationId xmlns:p14="http://schemas.microsoft.com/office/powerpoint/2010/main" val="1755383272"/>
+        <p14:creationId xmlns:p14="http://schemas.microsoft.com/office/powerpoint/2010/main" val="1893970550"/>
       </p:ext>
     </p:extLst>
   </p:cSld>
@@ -4780,6 +4806,168 @@
       </p:grpSpPr>
       <p:sp>
         <p:nvSpPr>
+          <p:cNvPr id="5" name="Rectangle 4">
+            <a:extLst>
+              <a:ext uri="{FF2B5EF4-FFF2-40B4-BE49-F238E27FC236}">
+                <a16:creationId xmlns:a16="http://schemas.microsoft.com/office/drawing/2014/main" id="{CCAC0C37-AB18-42F0-875A-30B17D87A674}"/>
+              </a:ext>
+            </a:extLst>
+          </p:cNvPr>
+          <p:cNvSpPr/>
+          <p:nvPr/>
+        </p:nvSpPr>
+        <p:spPr>
+          <a:xfrm>
+            <a:off x="0" y="0"/>
+            <a:ext cx="51206400" cy="914400"/>
+          </a:xfrm>
+          <a:prstGeom prst="rect">
+            <a:avLst/>
+          </a:prstGeom>
+          <a:gradFill flip="none" rotWithShape="1">
+            <a:gsLst>
+              <a:gs pos="100000">
+                <a:srgbClr val="E1C68B">
+                  <a:alpha val="0"/>
+                </a:srgbClr>
+              </a:gs>
+              <a:gs pos="20000">
+                <a:srgbClr val="E1C68B"/>
+              </a:gs>
+            </a:gsLst>
+            <a:lin ang="5400000" scaled="1"/>
+            <a:tileRect/>
+          </a:gradFill>
+          <a:ln>
+            <a:noFill/>
+          </a:ln>
+        </p:spPr>
+        <p:style>
+          <a:lnRef idx="2">
+            <a:schemeClr val="accent1">
+              <a:shade val="50000"/>
+            </a:schemeClr>
+          </a:lnRef>
+          <a:fillRef idx="1">
+            <a:schemeClr val="accent1"/>
+          </a:fillRef>
+          <a:effectRef idx="0">
+            <a:schemeClr val="accent1"/>
+          </a:effectRef>
+          <a:fontRef idx="minor">
+            <a:schemeClr val="lt1"/>
+          </a:fontRef>
+        </p:style>
+        <p:txBody>
+          <a:bodyPr rot="0" spcFirstLastPara="0" vert="horz" wrap="square" lIns="91440" tIns="45720" rIns="91440" bIns="45720" numCol="1" spcCol="0" rtlCol="0" fromWordArt="0" anchor="ctr" anchorCtr="0" forceAA="0" compatLnSpc="1">
+            <a:prstTxWarp prst="textNoShape">
+              <a:avLst/>
+            </a:prstTxWarp>
+            <a:noAutofit/>
+          </a:bodyPr>
+          <a:lstStyle>
+            <a:defPPr>
+              <a:defRPr lang="en-US"/>
+            </a:defPPr>
+            <a:lvl1pPr marL="0" algn="l" defTabSz="5120272" rtl="0" eaLnBrk="1" latinLnBrk="0" hangingPunct="1">
+              <a:defRPr sz="10073" kern="1200">
+                <a:solidFill>
+                  <a:schemeClr val="lt1"/>
+                </a:solidFill>
+                <a:latin typeface="+mn-lt"/>
+                <a:ea typeface="+mn-ea"/>
+                <a:cs typeface="+mn-cs"/>
+              </a:defRPr>
+            </a:lvl1pPr>
+            <a:lvl2pPr marL="2560136" algn="l" defTabSz="5120272" rtl="0" eaLnBrk="1" latinLnBrk="0" hangingPunct="1">
+              <a:defRPr sz="10073" kern="1200">
+                <a:solidFill>
+                  <a:schemeClr val="lt1"/>
+                </a:solidFill>
+                <a:latin typeface="+mn-lt"/>
+                <a:ea typeface="+mn-ea"/>
+                <a:cs typeface="+mn-cs"/>
+              </a:defRPr>
+            </a:lvl2pPr>
+            <a:lvl3pPr marL="5120272" algn="l" defTabSz="5120272" rtl="0" eaLnBrk="1" latinLnBrk="0" hangingPunct="1">
+              <a:defRPr sz="10073" kern="1200">
+                <a:solidFill>
+                  <a:schemeClr val="lt1"/>
+                </a:solidFill>
+                <a:latin typeface="+mn-lt"/>
+                <a:ea typeface="+mn-ea"/>
+                <a:cs typeface="+mn-cs"/>
+              </a:defRPr>
+            </a:lvl3pPr>
+            <a:lvl4pPr marL="7680408" algn="l" defTabSz="5120272" rtl="0" eaLnBrk="1" latinLnBrk="0" hangingPunct="1">
+              <a:defRPr sz="10073" kern="1200">
+                <a:solidFill>
+                  <a:schemeClr val="lt1"/>
+                </a:solidFill>
+                <a:latin typeface="+mn-lt"/>
+                <a:ea typeface="+mn-ea"/>
+                <a:cs typeface="+mn-cs"/>
+              </a:defRPr>
+            </a:lvl4pPr>
+            <a:lvl5pPr marL="10240544" algn="l" defTabSz="5120272" rtl="0" eaLnBrk="1" latinLnBrk="0" hangingPunct="1">
+              <a:defRPr sz="10073" kern="1200">
+                <a:solidFill>
+                  <a:schemeClr val="lt1"/>
+                </a:solidFill>
+                <a:latin typeface="+mn-lt"/>
+                <a:ea typeface="+mn-ea"/>
+                <a:cs typeface="+mn-cs"/>
+              </a:defRPr>
+            </a:lvl5pPr>
+            <a:lvl6pPr marL="12800680" algn="l" defTabSz="5120272" rtl="0" eaLnBrk="1" latinLnBrk="0" hangingPunct="1">
+              <a:defRPr sz="10073" kern="1200">
+                <a:solidFill>
+                  <a:schemeClr val="lt1"/>
+                </a:solidFill>
+                <a:latin typeface="+mn-lt"/>
+                <a:ea typeface="+mn-ea"/>
+                <a:cs typeface="+mn-cs"/>
+              </a:defRPr>
+            </a:lvl6pPr>
+            <a:lvl7pPr marL="15360816" algn="l" defTabSz="5120272" rtl="0" eaLnBrk="1" latinLnBrk="0" hangingPunct="1">
+              <a:defRPr sz="10073" kern="1200">
+                <a:solidFill>
+                  <a:schemeClr val="lt1"/>
+                </a:solidFill>
+                <a:latin typeface="+mn-lt"/>
+                <a:ea typeface="+mn-ea"/>
+                <a:cs typeface="+mn-cs"/>
+              </a:defRPr>
+            </a:lvl7pPr>
+            <a:lvl8pPr marL="17920952" algn="l" defTabSz="5120272" rtl="0" eaLnBrk="1" latinLnBrk="0" hangingPunct="1">
+              <a:defRPr sz="10073" kern="1200">
+                <a:solidFill>
+                  <a:schemeClr val="lt1"/>
+                </a:solidFill>
+                <a:latin typeface="+mn-lt"/>
+                <a:ea typeface="+mn-ea"/>
+                <a:cs typeface="+mn-cs"/>
+              </a:defRPr>
+            </a:lvl8pPr>
+            <a:lvl9pPr marL="20481088" algn="l" defTabSz="5120272" rtl="0" eaLnBrk="1" latinLnBrk="0" hangingPunct="1">
+              <a:defRPr sz="10073" kern="1200">
+                <a:solidFill>
+                  <a:schemeClr val="lt1"/>
+                </a:solidFill>
+                <a:latin typeface="+mn-lt"/>
+                <a:ea typeface="+mn-ea"/>
+                <a:cs typeface="+mn-cs"/>
+              </a:defRPr>
+            </a:lvl9pPr>
+          </a:lstStyle>
+          <a:p>
+            <a:pPr algn="ctr"/>
+            <a:endParaRPr lang="en-US"/>
+          </a:p>
+        </p:txBody>
+      </p:sp>
+      <p:sp>
+        <p:nvSpPr>
           <p:cNvPr id="2" name="TextBox 1"/>
           <p:cNvSpPr txBox="1"/>
           <p:nvPr/>
@@ -4844,7 +5032,37 @@
                 <a:ea typeface="Ebrima" pitchFamily="2" charset="0"/>
                 <a:cs typeface="Ebrima" pitchFamily="2" charset="0"/>
               </a:rPr>
-              <a:t> Borca Paredes</a:t>
+              <a:t> </a:t>
+            </a:r>
+            <a:r>
+              <a:rPr lang="en-US" sz="17400" dirty="0" err="1">
+                <a:effectLst>
+                  <a:outerShdw blurRad="38100" dist="38100" dir="2700000" algn="tl">
+                    <a:srgbClr val="000000">
+                      <a:alpha val="43137"/>
+                    </a:srgbClr>
+                  </a:outerShdw>
+                </a:effectLst>
+                <a:latin typeface="Ebrima" pitchFamily="2" charset="0"/>
+                <a:ea typeface="Ebrima" pitchFamily="2" charset="0"/>
+                <a:cs typeface="Ebrima" pitchFamily="2" charset="0"/>
+              </a:rPr>
+              <a:t>Borca</a:t>
+            </a:r>
+            <a:r>
+              <a:rPr lang="en-US" sz="17400" dirty="0">
+                <a:effectLst>
+                  <a:outerShdw blurRad="38100" dist="38100" dir="2700000" algn="tl">
+                    <a:srgbClr val="000000">
+                      <a:alpha val="43137"/>
+                    </a:srgbClr>
+                  </a:outerShdw>
+                </a:effectLst>
+                <a:latin typeface="Ebrima" pitchFamily="2" charset="0"/>
+                <a:ea typeface="Ebrima" pitchFamily="2" charset="0"/>
+                <a:cs typeface="Ebrima" pitchFamily="2" charset="0"/>
+              </a:rPr>
+              <a:t> Paredes</a:t>
             </a:r>
           </a:p>
           <a:p>
@@ -4852,7 +5070,7 @@
             <a:r>
               <a:rPr lang="en-US" sz="11100" dirty="0" err="1">
                 <a:solidFill>
-                  <a:srgbClr val="CC9900"/>
+                  <a:srgbClr val="EAAA00"/>
                 </a:solidFill>
                 <a:effectLst>
                   <a:outerShdw blurRad="38100" dist="38100" dir="2700000" algn="tl">
@@ -4870,7 +5088,7 @@
             <a:r>
               <a:rPr lang="en-US" sz="11100" dirty="0">
                 <a:solidFill>
-                  <a:srgbClr val="CC9900"/>
+                  <a:srgbClr val="EAAA00"/>
                 </a:solidFill>
                 <a:effectLst>
                   <a:outerShdw blurRad="38100" dist="38100" dir="2700000" algn="tl">
@@ -4888,7 +5106,7 @@
             <a:r>
               <a:rPr lang="en-US" sz="11100" dirty="0" err="1">
                 <a:solidFill>
-                  <a:srgbClr val="CC9900"/>
+                  <a:srgbClr val="EAAA00"/>
                 </a:solidFill>
                 <a:effectLst>
                   <a:outerShdw blurRad="38100" dist="38100" dir="2700000" algn="tl">
@@ -4906,7 +5124,7 @@
             <a:r>
               <a:rPr lang="en-US" sz="11100" dirty="0">
                 <a:solidFill>
-                  <a:srgbClr val="CC9900"/>
+                  <a:srgbClr val="EAAA00"/>
                 </a:solidFill>
                 <a:effectLst>
                   <a:outerShdw blurRad="38100" dist="38100" dir="2700000" algn="tl">
@@ -4924,7 +5142,7 @@
             <a:r>
               <a:rPr lang="en-US" sz="11100" dirty="0" err="1">
                 <a:solidFill>
-                  <a:srgbClr val="CC9900"/>
+                  <a:srgbClr val="EAAA00"/>
                 </a:solidFill>
                 <a:effectLst>
                   <a:outerShdw blurRad="38100" dist="38100" dir="2700000" algn="tl">
@@ -4941,7 +5159,7 @@
             </a:r>
             <a:endParaRPr lang="en-US" sz="11100" dirty="0">
               <a:solidFill>
-                <a:srgbClr val="CC9900"/>
+                <a:srgbClr val="EAAA00"/>
               </a:solidFill>
               <a:effectLst>
                 <a:outerShdw blurRad="38100" dist="38100" dir="2700000" algn="tl">
@@ -4959,10 +5177,10 @@
       </p:sp>
       <p:pic>
         <p:nvPicPr>
-          <p:cNvPr id="3" name="Picture 2">
+          <p:cNvPr id="4" name="Picture 3">
             <a:extLst>
               <a:ext uri="{FF2B5EF4-FFF2-40B4-BE49-F238E27FC236}">
-                <a16:creationId xmlns:a16="http://schemas.microsoft.com/office/drawing/2014/main" id="{DE232315-99B4-4AFA-A720-9CBF3028094C}"/>
+                <a16:creationId xmlns:a16="http://schemas.microsoft.com/office/drawing/2014/main" id="{B2AC9A54-0E4C-4D01-8342-631055409C3C}"/>
               </a:ext>
             </a:extLst>
           </p:cNvPr>
@@ -4995,10 +5213,10 @@
       </p:pic>
       <p:pic>
         <p:nvPicPr>
-          <p:cNvPr id="8" name="Picture 7">
+          <p:cNvPr id="7" name="Picture 6">
             <a:extLst>
               <a:ext uri="{FF2B5EF4-FFF2-40B4-BE49-F238E27FC236}">
-                <a16:creationId xmlns:a16="http://schemas.microsoft.com/office/drawing/2014/main" id="{78B6924D-93E1-4C31-919E-057D8B0C3354}"/>
+                <a16:creationId xmlns:a16="http://schemas.microsoft.com/office/drawing/2014/main" id="{9160BAA7-1233-4083-B3D6-EE81D0577184}"/>
               </a:ext>
             </a:extLst>
           </p:cNvPr>
@@ -5032,7 +5250,7 @@
     </p:spTree>
     <p:extLst>
       <p:ext uri="{BB962C8B-B14F-4D97-AF65-F5344CB8AC3E}">
-        <p14:creationId xmlns:p14="http://schemas.microsoft.com/office/powerpoint/2010/main" val="1893970550"/>
+        <p14:creationId xmlns:p14="http://schemas.microsoft.com/office/powerpoint/2010/main" val="4213147096"/>
       </p:ext>
     </p:extLst>
   </p:cSld>
@@ -5057,42 +5275,42 @@
 <file path=ppt/theme/theme1.xml><?xml version="1.0" encoding="utf-8"?>
 <a:theme xmlns:a="http://schemas.openxmlformats.org/drawingml/2006/main" name="Flow">
   <a:themeElements>
-    <a:clrScheme name="Purdue University Poster">
+    <a:clrScheme name="Custom 1">
       <a:dk1>
         <a:sysClr val="windowText" lastClr="000000"/>
       </a:dk1>
       <a:lt1>
-        <a:srgbClr val="FFFFFF"/>
+        <a:sysClr val="window" lastClr="FFFFFF"/>
       </a:lt1>
       <a:dk2>
-        <a:srgbClr val="3E3D2D"/>
+        <a:srgbClr val="39302A"/>
       </a:dk2>
       <a:lt2>
-        <a:srgbClr val="FFFF00"/>
+        <a:srgbClr val="E5DEDB"/>
       </a:lt2>
       <a:accent1>
-        <a:srgbClr val="FF6700"/>
+        <a:srgbClr val="B3A369"/>
       </a:accent1>
       <a:accent2>
-        <a:srgbClr val="71685A"/>
+        <a:srgbClr val="EAAA00"/>
       </a:accent2>
       <a:accent3>
-        <a:srgbClr val="FFC000"/>
+        <a:srgbClr val="F58025"/>
       </a:accent3>
       <a:accent4>
-        <a:srgbClr val="CC9900"/>
+        <a:srgbClr val="7030A0"/>
       </a:accent4>
       <a:accent5>
-        <a:srgbClr val="996600"/>
+        <a:srgbClr val="00263A"/>
       </a:accent5>
       <a:accent6>
-        <a:srgbClr val="FEA022"/>
+        <a:srgbClr val="9C6A6A"/>
       </a:accent6>
       <a:hlink>
-        <a:srgbClr val="00B0F0"/>
+        <a:srgbClr val="2998E3"/>
       </a:hlink>
       <a:folHlink>
-        <a:srgbClr val="0070C0"/>
+        <a:srgbClr val="7F723D"/>
       </a:folHlink>
     </a:clrScheme>
     <a:fontScheme name="Waveform">

</xml_diff>

<commit_message>
General update of the website style
</commit_message>
<xml_diff>
--- a/design/encabezado.pptx
+++ b/design/encabezado.pptx
@@ -5,11 +5,12 @@
     <p:sldMasterId id="2147483720" r:id="rId1"/>
   </p:sldMasterIdLst>
   <p:notesMasterIdLst>
-    <p:notesMasterId r:id="rId4"/>
+    <p:notesMasterId r:id="rId5"/>
   </p:notesMasterIdLst>
   <p:sldIdLst>
     <p:sldId id="268" r:id="rId2"/>
     <p:sldId id="269" r:id="rId3"/>
+    <p:sldId id="270" r:id="rId4"/>
   </p:sldIdLst>
   <p:sldSz cx="51206400" cy="28803600"/>
   <p:notesSz cx="6858000" cy="9144000"/>
@@ -219,7 +220,7 @@
           <a:p>
             <a:fld id="{A9FE03EE-1C82-4E99-9DF8-4A05B170F250}" type="datetimeFigureOut">
               <a:rPr lang="en-US" smtClean="0"/>
-              <a:t>2/26/2020</a:t>
+              <a:t>5/19/2021</a:t>
             </a:fld>
             <a:endParaRPr lang="en-US" dirty="0"/>
           </a:p>
@@ -664,6 +665,95 @@
 </p:notes>
 </file>
 
+<file path=ppt/notesSlides/notesSlide3.xml><?xml version="1.0" encoding="utf-8"?>
+<p:notes xmlns:a="http://schemas.openxmlformats.org/drawingml/2006/main" xmlns:r="http://schemas.openxmlformats.org/officeDocument/2006/relationships" xmlns:p="http://schemas.openxmlformats.org/presentationml/2006/main">
+  <p:cSld>
+    <p:spTree>
+      <p:nvGrpSpPr>
+        <p:cNvPr id="1" name=""/>
+        <p:cNvGrpSpPr/>
+        <p:nvPr/>
+      </p:nvGrpSpPr>
+      <p:grpSpPr>
+        <a:xfrm>
+          <a:off x="0" y="0"/>
+          <a:ext cx="0" cy="0"/>
+          <a:chOff x="0" y="0"/>
+          <a:chExt cx="0" cy="0"/>
+        </a:xfrm>
+      </p:grpSpPr>
+      <p:sp>
+        <p:nvSpPr>
+          <p:cNvPr id="2" name="Slide Image Placeholder 1"/>
+          <p:cNvSpPr>
+            <a:spLocks noGrp="1" noRot="1" noChangeAspect="1"/>
+          </p:cNvSpPr>
+          <p:nvPr>
+            <p:ph type="sldImg"/>
+          </p:nvPr>
+        </p:nvSpPr>
+        <p:spPr>
+          <a:xfrm>
+            <a:off x="381000" y="685800"/>
+            <a:ext cx="6096000" cy="3429000"/>
+          </a:xfrm>
+        </p:spPr>
+      </p:sp>
+      <p:sp>
+        <p:nvSpPr>
+          <p:cNvPr id="3" name="Notes Placeholder 2"/>
+          <p:cNvSpPr>
+            <a:spLocks noGrp="1"/>
+          </p:cNvSpPr>
+          <p:nvPr>
+            <p:ph type="body" idx="1"/>
+          </p:nvPr>
+        </p:nvSpPr>
+        <p:spPr/>
+        <p:txBody>
+          <a:bodyPr/>
+          <a:lstStyle/>
+          <a:p>
+            <a:endParaRPr lang="en-US" dirty="0"/>
+          </a:p>
+        </p:txBody>
+      </p:sp>
+      <p:sp>
+        <p:nvSpPr>
+          <p:cNvPr id="4" name="Slide Number Placeholder 3"/>
+          <p:cNvSpPr>
+            <a:spLocks noGrp="1"/>
+          </p:cNvSpPr>
+          <p:nvPr>
+            <p:ph type="sldNum" sz="quarter" idx="10"/>
+          </p:nvPr>
+        </p:nvSpPr>
+        <p:spPr/>
+        <p:txBody>
+          <a:bodyPr/>
+          <a:lstStyle/>
+          <a:p>
+            <a:fld id="{FAC575F2-BB5C-44BA-9A26-65F68A1741DE}" type="slidenum">
+              <a:rPr lang="en-US" smtClean="0"/>
+              <a:t>3</a:t>
+            </a:fld>
+            <a:endParaRPr lang="en-US" dirty="0"/>
+          </a:p>
+        </p:txBody>
+      </p:sp>
+    </p:spTree>
+    <p:extLst>
+      <p:ext uri="{BB962C8B-B14F-4D97-AF65-F5344CB8AC3E}">
+        <p14:creationId xmlns:p14="http://schemas.microsoft.com/office/powerpoint/2010/main" val="774451828"/>
+      </p:ext>
+    </p:extLst>
+  </p:cSld>
+  <p:clrMapOvr>
+    <a:masterClrMapping/>
+  </p:clrMapOvr>
+</p:notes>
+</file>
+
 <file path=ppt/slideLayouts/slideLayout1.xml><?xml version="1.0" encoding="utf-8"?>
 <p:sldLayout xmlns:a="http://schemas.openxmlformats.org/drawingml/2006/main" xmlns:r="http://schemas.openxmlformats.org/officeDocument/2006/relationships" xmlns:p="http://schemas.openxmlformats.org/presentationml/2006/main" type="title" preserve="1">
   <p:cSld name="Title Slide">
@@ -835,7 +925,7 @@
           <a:p>
             <a:fld id="{D44D2351-1F20-4245-B389-419D0CB28AFC}" type="datetime12">
               <a:rPr lang="en-US" smtClean="0"/>
-              <a:t>1:16 AM</a:t>
+              <a:t>4:14 PM</a:t>
             </a:fld>
             <a:endParaRPr lang="en-US" dirty="0"/>
           </a:p>
@@ -1014,7 +1104,7 @@
           <a:p>
             <a:fld id="{7E522AC0-2225-44D5-85DD-69FF70C3BCA3}" type="datetime12">
               <a:rPr lang="en-US" smtClean="0"/>
-              <a:t>1:16 AM</a:t>
+              <a:t>4:14 PM</a:t>
             </a:fld>
             <a:endParaRPr lang="en-US" dirty="0"/>
           </a:p>
@@ -1203,7 +1293,7 @@
           <a:p>
             <a:fld id="{4E7D4F7B-3389-415B-B217-40891253FD77}" type="datetime12">
               <a:rPr lang="en-US" smtClean="0"/>
-              <a:t>1:16 AM</a:t>
+              <a:t>4:14 PM</a:t>
             </a:fld>
             <a:endParaRPr lang="en-US" dirty="0"/>
           </a:p>
@@ -1382,7 +1472,7 @@
           <a:p>
             <a:fld id="{A289EB68-F6EE-4E9A-BB3F-5D7F535B883B}" type="datetime12">
               <a:rPr lang="en-US" smtClean="0"/>
-              <a:t>1:16 AM</a:t>
+              <a:t>4:14 PM</a:t>
             </a:fld>
             <a:endParaRPr lang="en-US" dirty="0"/>
           </a:p>
@@ -1638,7 +1728,7 @@
           <a:p>
             <a:fld id="{5ADCBF7E-A68A-42EE-9D9D-825A9A1291F2}" type="datetime12">
               <a:rPr lang="en-US" smtClean="0"/>
-              <a:t>1:16 AM</a:t>
+              <a:t>4:14 PM</a:t>
             </a:fld>
             <a:endParaRPr lang="en-US" dirty="0"/>
           </a:p>
@@ -1916,7 +2006,7 @@
           <a:p>
             <a:fld id="{D1637FC1-476F-4955-936A-6E8B672DC59D}" type="datetime12">
               <a:rPr lang="en-US" smtClean="0"/>
-              <a:t>1:16 AM</a:t>
+              <a:t>4:14 PM</a:t>
             </a:fld>
             <a:endParaRPr lang="en-US" dirty="0"/>
           </a:p>
@@ -2308,7 +2398,7 @@
           <a:p>
             <a:fld id="{26825709-43EF-470A-8E41-672EB20A7A8D}" type="datetime12">
               <a:rPr lang="en-US" smtClean="0"/>
-              <a:t>1:16 AM</a:t>
+              <a:t>4:14 PM</a:t>
             </a:fld>
             <a:endParaRPr lang="en-US" dirty="0"/>
           </a:p>
@@ -2472,7 +2562,7 @@
           <a:p>
             <a:fld id="{542A77ED-B94B-4871-BDF3-4CDFC26A2499}" type="datetime12">
               <a:rPr lang="en-US" smtClean="0"/>
-              <a:t>1:16 AM</a:t>
+              <a:t>4:14 PM</a:t>
             </a:fld>
             <a:endParaRPr lang="en-US" dirty="0"/>
           </a:p>
@@ -2577,7 +2667,7 @@
           <a:p>
             <a:fld id="{74FF3B90-6FDE-45A9-BC95-EB52BB856063}" type="datetime12">
               <a:rPr lang="en-US" smtClean="0"/>
-              <a:t>1:16 AM</a:t>
+              <a:t>4:14 PM</a:t>
             </a:fld>
             <a:endParaRPr lang="en-US" dirty="0"/>
           </a:p>
@@ -2852,7 +2942,7 @@
           <a:p>
             <a:fld id="{D683E704-2A04-4A09-9EC8-A3BF9D1B0721}" type="datetime12">
               <a:rPr lang="en-US" smtClean="0"/>
-              <a:t>1:16 AM</a:t>
+              <a:t>4:14 PM</a:t>
             </a:fld>
             <a:endParaRPr lang="en-US" dirty="0"/>
           </a:p>
@@ -3154,7 +3244,7 @@
           <a:p>
             <a:fld id="{A2F15518-8DCD-46C4-9857-30A40E7F1F36}" type="datetime12">
               <a:rPr lang="en-US" smtClean="0"/>
-              <a:t>1:16 AM</a:t>
+              <a:t>4:14 PM</a:t>
             </a:fld>
             <a:endParaRPr lang="en-US" dirty="0"/>
           </a:p>
@@ -3937,7 +4027,7 @@
           <a:p>
             <a:fld id="{3E274671-4571-4D3D-B546-3CBC7B697089}" type="datetime12">
               <a:rPr lang="en-US" smtClean="0"/>
-              <a:t>1:16 AM</a:t>
+              <a:t>4:14 PM</a:t>
             </a:fld>
             <a:endParaRPr lang="en-US" dirty="0"/>
           </a:p>
@@ -5251,6 +5341,506 @@
     <p:extLst>
       <p:ext uri="{BB962C8B-B14F-4D97-AF65-F5344CB8AC3E}">
         <p14:creationId xmlns:p14="http://schemas.microsoft.com/office/powerpoint/2010/main" val="4213147096"/>
+      </p:ext>
+    </p:extLst>
+  </p:cSld>
+  <p:clrMapOvr>
+    <a:masterClrMapping/>
+  </p:clrMapOvr>
+  <mc:AlternateContent xmlns:mc="http://schemas.openxmlformats.org/markup-compatibility/2006" xmlns:p14="http://schemas.microsoft.com/office/powerpoint/2010/main">
+    <mc:Choice Requires="p14">
+      <p:transition spd="med" p14:dur="700">
+        <p:fade/>
+      </p:transition>
+    </mc:Choice>
+    <mc:Fallback xmlns="">
+      <p:transition spd="med">
+        <p:fade/>
+      </p:transition>
+    </mc:Fallback>
+  </mc:AlternateContent>
+</p:sld>
+</file>
+
+<file path=ppt/slides/slide3.xml><?xml version="1.0" encoding="utf-8"?>
+<p:sld xmlns:a="http://schemas.openxmlformats.org/drawingml/2006/main" xmlns:r="http://schemas.openxmlformats.org/officeDocument/2006/relationships" xmlns:p="http://schemas.openxmlformats.org/presentationml/2006/main">
+  <p:cSld>
+    <p:spTree>
+      <p:nvGrpSpPr>
+        <p:cNvPr id="1" name=""/>
+        <p:cNvGrpSpPr/>
+        <p:nvPr/>
+      </p:nvGrpSpPr>
+      <p:grpSpPr>
+        <a:xfrm>
+          <a:off x="0" y="0"/>
+          <a:ext cx="0" cy="0"/>
+          <a:chOff x="0" y="0"/>
+          <a:chExt cx="0" cy="0"/>
+        </a:xfrm>
+      </p:grpSpPr>
+      <p:sp>
+        <p:nvSpPr>
+          <p:cNvPr id="5" name="Rectangle 4">
+            <a:extLst>
+              <a:ext uri="{FF2B5EF4-FFF2-40B4-BE49-F238E27FC236}">
+                <a16:creationId xmlns:a16="http://schemas.microsoft.com/office/drawing/2014/main" id="{CCAC0C37-AB18-42F0-875A-30B17D87A674}"/>
+              </a:ext>
+            </a:extLst>
+          </p:cNvPr>
+          <p:cNvSpPr/>
+          <p:nvPr/>
+        </p:nvSpPr>
+        <p:spPr>
+          <a:xfrm>
+            <a:off x="0" y="0"/>
+            <a:ext cx="51206400" cy="914400"/>
+          </a:xfrm>
+          <a:prstGeom prst="rect">
+            <a:avLst/>
+          </a:prstGeom>
+          <a:gradFill flip="none" rotWithShape="1">
+            <a:gsLst>
+              <a:gs pos="100000">
+                <a:srgbClr val="E1C68B">
+                  <a:alpha val="0"/>
+                </a:srgbClr>
+              </a:gs>
+              <a:gs pos="20000">
+                <a:srgbClr val="E1C68B"/>
+              </a:gs>
+            </a:gsLst>
+            <a:lin ang="5400000" scaled="1"/>
+            <a:tileRect/>
+          </a:gradFill>
+          <a:ln>
+            <a:noFill/>
+          </a:ln>
+        </p:spPr>
+        <p:style>
+          <a:lnRef idx="2">
+            <a:schemeClr val="accent1">
+              <a:shade val="50000"/>
+            </a:schemeClr>
+          </a:lnRef>
+          <a:fillRef idx="1">
+            <a:schemeClr val="accent1"/>
+          </a:fillRef>
+          <a:effectRef idx="0">
+            <a:schemeClr val="accent1"/>
+          </a:effectRef>
+          <a:fontRef idx="minor">
+            <a:schemeClr val="lt1"/>
+          </a:fontRef>
+        </p:style>
+        <p:txBody>
+          <a:bodyPr rot="0" spcFirstLastPara="0" vert="horz" wrap="square" lIns="91440" tIns="45720" rIns="91440" bIns="45720" numCol="1" spcCol="0" rtlCol="0" fromWordArt="0" anchor="ctr" anchorCtr="0" forceAA="0" compatLnSpc="1">
+            <a:prstTxWarp prst="textNoShape">
+              <a:avLst/>
+            </a:prstTxWarp>
+            <a:noAutofit/>
+          </a:bodyPr>
+          <a:lstStyle>
+            <a:defPPr>
+              <a:defRPr lang="en-US"/>
+            </a:defPPr>
+            <a:lvl1pPr marL="0" algn="l" defTabSz="5120272" rtl="0" eaLnBrk="1" latinLnBrk="0" hangingPunct="1">
+              <a:defRPr sz="10073" kern="1200">
+                <a:solidFill>
+                  <a:schemeClr val="lt1"/>
+                </a:solidFill>
+                <a:latin typeface="+mn-lt"/>
+                <a:ea typeface="+mn-ea"/>
+                <a:cs typeface="+mn-cs"/>
+              </a:defRPr>
+            </a:lvl1pPr>
+            <a:lvl2pPr marL="2560136" algn="l" defTabSz="5120272" rtl="0" eaLnBrk="1" latinLnBrk="0" hangingPunct="1">
+              <a:defRPr sz="10073" kern="1200">
+                <a:solidFill>
+                  <a:schemeClr val="lt1"/>
+                </a:solidFill>
+                <a:latin typeface="+mn-lt"/>
+                <a:ea typeface="+mn-ea"/>
+                <a:cs typeface="+mn-cs"/>
+              </a:defRPr>
+            </a:lvl2pPr>
+            <a:lvl3pPr marL="5120272" algn="l" defTabSz="5120272" rtl="0" eaLnBrk="1" latinLnBrk="0" hangingPunct="1">
+              <a:defRPr sz="10073" kern="1200">
+                <a:solidFill>
+                  <a:schemeClr val="lt1"/>
+                </a:solidFill>
+                <a:latin typeface="+mn-lt"/>
+                <a:ea typeface="+mn-ea"/>
+                <a:cs typeface="+mn-cs"/>
+              </a:defRPr>
+            </a:lvl3pPr>
+            <a:lvl4pPr marL="7680408" algn="l" defTabSz="5120272" rtl="0" eaLnBrk="1" latinLnBrk="0" hangingPunct="1">
+              <a:defRPr sz="10073" kern="1200">
+                <a:solidFill>
+                  <a:schemeClr val="lt1"/>
+                </a:solidFill>
+                <a:latin typeface="+mn-lt"/>
+                <a:ea typeface="+mn-ea"/>
+                <a:cs typeface="+mn-cs"/>
+              </a:defRPr>
+            </a:lvl4pPr>
+            <a:lvl5pPr marL="10240544" algn="l" defTabSz="5120272" rtl="0" eaLnBrk="1" latinLnBrk="0" hangingPunct="1">
+              <a:defRPr sz="10073" kern="1200">
+                <a:solidFill>
+                  <a:schemeClr val="lt1"/>
+                </a:solidFill>
+                <a:latin typeface="+mn-lt"/>
+                <a:ea typeface="+mn-ea"/>
+                <a:cs typeface="+mn-cs"/>
+              </a:defRPr>
+            </a:lvl5pPr>
+            <a:lvl6pPr marL="12800680" algn="l" defTabSz="5120272" rtl="0" eaLnBrk="1" latinLnBrk="0" hangingPunct="1">
+              <a:defRPr sz="10073" kern="1200">
+                <a:solidFill>
+                  <a:schemeClr val="lt1"/>
+                </a:solidFill>
+                <a:latin typeface="+mn-lt"/>
+                <a:ea typeface="+mn-ea"/>
+                <a:cs typeface="+mn-cs"/>
+              </a:defRPr>
+            </a:lvl6pPr>
+            <a:lvl7pPr marL="15360816" algn="l" defTabSz="5120272" rtl="0" eaLnBrk="1" latinLnBrk="0" hangingPunct="1">
+              <a:defRPr sz="10073" kern="1200">
+                <a:solidFill>
+                  <a:schemeClr val="lt1"/>
+                </a:solidFill>
+                <a:latin typeface="+mn-lt"/>
+                <a:ea typeface="+mn-ea"/>
+                <a:cs typeface="+mn-cs"/>
+              </a:defRPr>
+            </a:lvl7pPr>
+            <a:lvl8pPr marL="17920952" algn="l" defTabSz="5120272" rtl="0" eaLnBrk="1" latinLnBrk="0" hangingPunct="1">
+              <a:defRPr sz="10073" kern="1200">
+                <a:solidFill>
+                  <a:schemeClr val="lt1"/>
+                </a:solidFill>
+                <a:latin typeface="+mn-lt"/>
+                <a:ea typeface="+mn-ea"/>
+                <a:cs typeface="+mn-cs"/>
+              </a:defRPr>
+            </a:lvl8pPr>
+            <a:lvl9pPr marL="20481088" algn="l" defTabSz="5120272" rtl="0" eaLnBrk="1" latinLnBrk="0" hangingPunct="1">
+              <a:defRPr sz="10073" kern="1200">
+                <a:solidFill>
+                  <a:schemeClr val="lt1"/>
+                </a:solidFill>
+                <a:latin typeface="+mn-lt"/>
+                <a:ea typeface="+mn-ea"/>
+                <a:cs typeface="+mn-cs"/>
+              </a:defRPr>
+            </a:lvl9pPr>
+          </a:lstStyle>
+          <a:p>
+            <a:pPr algn="ctr"/>
+            <a:endParaRPr lang="en-US"/>
+          </a:p>
+        </p:txBody>
+      </p:sp>
+      <p:sp>
+        <p:nvSpPr>
+          <p:cNvPr id="2" name="TextBox 1"/>
+          <p:cNvSpPr txBox="1"/>
+          <p:nvPr/>
+        </p:nvSpPr>
+        <p:spPr>
+          <a:xfrm>
+            <a:off x="0" y="496120"/>
+            <a:ext cx="51206400" cy="4539704"/>
+          </a:xfrm>
+          <a:prstGeom prst="rect">
+            <a:avLst/>
+          </a:prstGeom>
+          <a:noFill/>
+        </p:spPr>
+        <p:txBody>
+          <a:bodyPr wrap="square" rtlCol="0">
+            <a:spAutoFit/>
+          </a:bodyPr>
+          <a:lstStyle/>
+          <a:p>
+            <a:pPr algn="ctr"/>
+            <a:r>
+              <a:rPr lang="en-US" sz="17400" dirty="0">
+                <a:solidFill>
+                  <a:srgbClr val="F58025"/>
+                </a:solidFill>
+                <a:effectLst>
+                  <a:outerShdw blurRad="38100" dist="38100" dir="2700000" algn="tl">
+                    <a:srgbClr val="000000">
+                      <a:alpha val="43137"/>
+                    </a:srgbClr>
+                  </a:outerShdw>
+                </a:effectLst>
+                <a:latin typeface="Ebrima" pitchFamily="2" charset="0"/>
+                <a:ea typeface="Ebrima" pitchFamily="2" charset="0"/>
+                <a:cs typeface="Ebrima" pitchFamily="2" charset="0"/>
+              </a:rPr>
+              <a:t>Carlos </a:t>
+            </a:r>
+            <a:r>
+              <a:rPr lang="en-US" sz="17400" dirty="0" err="1">
+                <a:solidFill>
+                  <a:srgbClr val="F58025"/>
+                </a:solidFill>
+                <a:effectLst>
+                  <a:outerShdw blurRad="38100" dist="38100" dir="2700000" algn="tl">
+                    <a:srgbClr val="000000">
+                      <a:alpha val="43137"/>
+                    </a:srgbClr>
+                  </a:outerShdw>
+                </a:effectLst>
+                <a:latin typeface="Ebrima" pitchFamily="2" charset="0"/>
+                <a:ea typeface="Ebrima" pitchFamily="2" charset="0"/>
+                <a:cs typeface="Ebrima" pitchFamily="2" charset="0"/>
+              </a:rPr>
+              <a:t>Hernán</a:t>
+            </a:r>
+            <a:r>
+              <a:rPr lang="en-US" sz="17400" dirty="0">
+                <a:solidFill>
+                  <a:srgbClr val="F58025"/>
+                </a:solidFill>
+                <a:effectLst>
+                  <a:outerShdw blurRad="38100" dist="38100" dir="2700000" algn="tl">
+                    <a:srgbClr val="000000">
+                      <a:alpha val="43137"/>
+                    </a:srgbClr>
+                  </a:outerShdw>
+                </a:effectLst>
+                <a:latin typeface="Ebrima" pitchFamily="2" charset="0"/>
+                <a:ea typeface="Ebrima" pitchFamily="2" charset="0"/>
+                <a:cs typeface="Ebrima" pitchFamily="2" charset="0"/>
+              </a:rPr>
+              <a:t> </a:t>
+            </a:r>
+            <a:r>
+              <a:rPr lang="en-US" sz="17400" dirty="0" err="1">
+                <a:solidFill>
+                  <a:srgbClr val="F58025"/>
+                </a:solidFill>
+                <a:effectLst>
+                  <a:outerShdw blurRad="38100" dist="38100" dir="2700000" algn="tl">
+                    <a:srgbClr val="000000">
+                      <a:alpha val="43137"/>
+                    </a:srgbClr>
+                  </a:outerShdw>
+                </a:effectLst>
+                <a:latin typeface="Ebrima" pitchFamily="2" charset="0"/>
+                <a:ea typeface="Ebrima" pitchFamily="2" charset="0"/>
+                <a:cs typeface="Ebrima" pitchFamily="2" charset="0"/>
+              </a:rPr>
+              <a:t>Borca</a:t>
+            </a:r>
+            <a:r>
+              <a:rPr lang="en-US" sz="17400" dirty="0">
+                <a:solidFill>
+                  <a:srgbClr val="F58025"/>
+                </a:solidFill>
+                <a:effectLst>
+                  <a:outerShdw blurRad="38100" dist="38100" dir="2700000" algn="tl">
+                    <a:srgbClr val="000000">
+                      <a:alpha val="43137"/>
+                    </a:srgbClr>
+                  </a:outerShdw>
+                </a:effectLst>
+                <a:latin typeface="Ebrima" pitchFamily="2" charset="0"/>
+                <a:ea typeface="Ebrima" pitchFamily="2" charset="0"/>
+                <a:cs typeface="Ebrima" pitchFamily="2" charset="0"/>
+              </a:rPr>
+              <a:t> Paredes</a:t>
+            </a:r>
+          </a:p>
+          <a:p>
+            <a:pPr algn="ctr"/>
+            <a:r>
+              <a:rPr lang="en-US" sz="11100" dirty="0" err="1">
+                <a:solidFill>
+                  <a:srgbClr val="EAAA00"/>
+                </a:solidFill>
+                <a:effectLst>
+                  <a:outerShdw blurRad="38100" dist="38100" dir="2700000" algn="tl">
+                    <a:srgbClr val="000000">
+                      <a:alpha val="43137"/>
+                    </a:srgbClr>
+                  </a:outerShdw>
+                </a:effectLst>
+                <a:latin typeface="Ebrima" pitchFamily="2" charset="0"/>
+                <a:ea typeface="Ebrima" pitchFamily="2" charset="0"/>
+                <a:cs typeface="Ebrima" pitchFamily="2" charset="0"/>
+              </a:rPr>
+              <a:t>Químico</a:t>
+            </a:r>
+            <a:r>
+              <a:rPr lang="en-US" sz="11100" dirty="0">
+                <a:solidFill>
+                  <a:srgbClr val="EAAA00"/>
+                </a:solidFill>
+                <a:effectLst>
+                  <a:outerShdw blurRad="38100" dist="38100" dir="2700000" algn="tl">
+                    <a:srgbClr val="000000">
+                      <a:alpha val="43137"/>
+                    </a:srgbClr>
+                  </a:outerShdw>
+                </a:effectLst>
+                <a:latin typeface="Ebrima" pitchFamily="2" charset="0"/>
+                <a:ea typeface="Ebrima" pitchFamily="2" charset="0"/>
+                <a:cs typeface="Ebrima" pitchFamily="2" charset="0"/>
+              </a:rPr>
+              <a:t> </a:t>
+            </a:r>
+            <a:r>
+              <a:rPr lang="en-US" sz="11100" dirty="0" err="1">
+                <a:solidFill>
+                  <a:srgbClr val="EAAA00"/>
+                </a:solidFill>
+                <a:effectLst>
+                  <a:outerShdw blurRad="38100" dist="38100" dir="2700000" algn="tl">
+                    <a:srgbClr val="000000">
+                      <a:alpha val="43137"/>
+                    </a:srgbClr>
+                  </a:outerShdw>
+                </a:effectLst>
+                <a:latin typeface="Ebrima" pitchFamily="2" charset="0"/>
+                <a:ea typeface="Ebrima" pitchFamily="2" charset="0"/>
+                <a:cs typeface="Ebrima" pitchFamily="2" charset="0"/>
+              </a:rPr>
+              <a:t>Teórico</a:t>
+            </a:r>
+            <a:r>
+              <a:rPr lang="en-US" sz="11100" dirty="0">
+                <a:solidFill>
+                  <a:srgbClr val="EAAA00"/>
+                </a:solidFill>
+                <a:effectLst>
+                  <a:outerShdw blurRad="38100" dist="38100" dir="2700000" algn="tl">
+                    <a:srgbClr val="000000">
+                      <a:alpha val="43137"/>
+                    </a:srgbClr>
+                  </a:outerShdw>
+                </a:effectLst>
+                <a:latin typeface="Ebrima" pitchFamily="2" charset="0"/>
+                <a:ea typeface="Ebrima" pitchFamily="2" charset="0"/>
+                <a:cs typeface="Ebrima" pitchFamily="2" charset="0"/>
+              </a:rPr>
+              <a:t> y </a:t>
+            </a:r>
+            <a:r>
+              <a:rPr lang="en-US" sz="11100" dirty="0" err="1">
+                <a:solidFill>
+                  <a:srgbClr val="EAAA00"/>
+                </a:solidFill>
+                <a:effectLst>
+                  <a:outerShdw blurRad="38100" dist="38100" dir="2700000" algn="tl">
+                    <a:srgbClr val="000000">
+                      <a:alpha val="43137"/>
+                    </a:srgbClr>
+                  </a:outerShdw>
+                </a:effectLst>
+                <a:latin typeface="Ebrima" pitchFamily="2" charset="0"/>
+                <a:ea typeface="Ebrima" pitchFamily="2" charset="0"/>
+                <a:cs typeface="Ebrima" pitchFamily="2" charset="0"/>
+              </a:rPr>
+              <a:t>Computacional</a:t>
+            </a:r>
+            <a:endParaRPr lang="en-US" sz="11100" dirty="0">
+              <a:solidFill>
+                <a:srgbClr val="EAAA00"/>
+              </a:solidFill>
+              <a:effectLst>
+                <a:outerShdw blurRad="38100" dist="38100" dir="2700000" algn="tl">
+                  <a:srgbClr val="000000">
+                    <a:alpha val="43137"/>
+                  </a:srgbClr>
+                </a:outerShdw>
+              </a:effectLst>
+              <a:latin typeface="Ebrima" pitchFamily="2" charset="0"/>
+              <a:ea typeface="Ebrima" pitchFamily="2" charset="0"/>
+              <a:cs typeface="Ebrima" pitchFamily="2" charset="0"/>
+            </a:endParaRPr>
+          </a:p>
+        </p:txBody>
+      </p:sp>
+      <p:pic>
+        <p:nvPicPr>
+          <p:cNvPr id="4" name="Picture 3">
+            <a:extLst>
+              <a:ext uri="{FF2B5EF4-FFF2-40B4-BE49-F238E27FC236}">
+                <a16:creationId xmlns:a16="http://schemas.microsoft.com/office/drawing/2014/main" id="{B2AC9A54-0E4C-4D01-8342-631055409C3C}"/>
+              </a:ext>
+            </a:extLst>
+          </p:cNvPr>
+          <p:cNvPicPr>
+            <a:picLocks noChangeAspect="1"/>
+          </p:cNvPicPr>
+          <p:nvPr/>
+        </p:nvPicPr>
+        <p:blipFill>
+          <a:blip r:embed="rId3">
+            <a:extLst>
+              <a:ext uri="{28A0092B-C50C-407E-A947-70E740481C1C}">
+                <a14:useLocalDpi xmlns:a14="http://schemas.microsoft.com/office/drawing/2010/main" val="0"/>
+              </a:ext>
+            </a:extLst>
+          </a:blip>
+          <a:stretch>
+            <a:fillRect/>
+          </a:stretch>
+        </p:blipFill>
+        <p:spPr>
+          <a:xfrm>
+            <a:off x="5646022" y="457200"/>
+            <a:ext cx="4313903" cy="4114800"/>
+          </a:xfrm>
+          <a:prstGeom prst="rect">
+            <a:avLst/>
+          </a:prstGeom>
+        </p:spPr>
+      </p:pic>
+      <p:pic>
+        <p:nvPicPr>
+          <p:cNvPr id="7" name="Picture 6">
+            <a:extLst>
+              <a:ext uri="{FF2B5EF4-FFF2-40B4-BE49-F238E27FC236}">
+                <a16:creationId xmlns:a16="http://schemas.microsoft.com/office/drawing/2014/main" id="{9160BAA7-1233-4083-B3D6-EE81D0577184}"/>
+              </a:ext>
+            </a:extLst>
+          </p:cNvPr>
+          <p:cNvPicPr>
+            <a:picLocks noChangeAspect="1"/>
+          </p:cNvPicPr>
+          <p:nvPr/>
+        </p:nvPicPr>
+        <p:blipFill>
+          <a:blip r:embed="rId4">
+            <a:extLst>
+              <a:ext uri="{28A0092B-C50C-407E-A947-70E740481C1C}">
+                <a14:useLocalDpi xmlns:a14="http://schemas.microsoft.com/office/drawing/2010/main" val="0"/>
+              </a:ext>
+            </a:extLst>
+          </a:blip>
+          <a:stretch>
+            <a:fillRect/>
+          </a:stretch>
+        </p:blipFill>
+        <p:spPr>
+          <a:xfrm flipH="1">
+            <a:off x="41605200" y="731520"/>
+            <a:ext cx="4053561" cy="3657600"/>
+          </a:xfrm>
+          <a:prstGeom prst="rect">
+            <a:avLst/>
+          </a:prstGeom>
+        </p:spPr>
+      </p:pic>
+    </p:spTree>
+    <p:extLst>
+      <p:ext uri="{BB962C8B-B14F-4D97-AF65-F5344CB8AC3E}">
+        <p14:creationId xmlns:p14="http://schemas.microsoft.com/office/powerpoint/2010/main" val="3291150528"/>
       </p:ext>
     </p:extLst>
   </p:cSld>

</xml_diff>